<commit_message>
Fixed reference error on slide 33
</commit_message>
<xml_diff>
--- a/Requirements-Engineering/RE-L10-Validation.pptx
+++ b/Requirements-Engineering/RE-L10-Validation.pptx
@@ -401,7 +401,7 @@
             <a:pPr indent="0" algn="r">
               <a:buNone/>
             </a:pPr>
-            <a:fld id="{FAC15CE0-D1F1-491F-9565-AF25824D6AA0}" type="slidenum">
+            <a:fld id="{E0A14DA4-F86C-4020-93E5-C621014A40CE}" type="slidenum">
               <a:rPr b="0" lang="en-US" sz="1400" spc="-1" strike="noStrike">
                 <a:solidFill>
                   <a:srgbClr val="000000"/>
@@ -455,7 +455,7 @@
         <p:spPr>
           <a:xfrm>
             <a:off x="533520" y="763560"/>
-            <a:ext cx="6698160" cy="3766320"/>
+            <a:ext cx="6697800" cy="3765960"/>
           </a:xfrm>
           <a:prstGeom prst="rect">
             <a:avLst/>
@@ -478,7 +478,7 @@
         <p:spPr>
           <a:xfrm>
             <a:off x="777240" y="4777560"/>
-            <a:ext cx="6211800" cy="4520160"/>
+            <a:ext cx="6211440" cy="4519800"/>
           </a:xfrm>
           <a:prstGeom prst="rect">
             <a:avLst/>
@@ -518,7 +518,7 @@
         <p:spPr>
           <a:xfrm>
             <a:off x="4399200" y="9555480"/>
-            <a:ext cx="3367080" cy="496800"/>
+            <a:ext cx="3366720" cy="496440"/>
           </a:xfrm>
           <a:prstGeom prst="rect">
             <a:avLst/>
@@ -560,7 +560,7 @@
                 <a:tab algn="l" pos="0"/>
               </a:tabLst>
             </a:pPr>
-            <a:fld id="{0B07D096-7826-4E20-B2F1-D30B14D4FD98}" type="slidenum">
+            <a:fld id="{488906ED-8B93-4185-8B8C-C119636DE142}" type="slidenum">
               <a:rPr b="0" lang="de-DE" sz="1800" spc="-1" strike="noStrike">
                 <a:solidFill>
                   <a:srgbClr val="000000"/>
@@ -614,7 +614,7 @@
         <p:spPr>
           <a:xfrm>
             <a:off x="533520" y="763560"/>
-            <a:ext cx="6698160" cy="3766320"/>
+            <a:ext cx="6697800" cy="3765960"/>
           </a:xfrm>
           <a:prstGeom prst="rect">
             <a:avLst/>
@@ -637,7 +637,7 @@
         <p:spPr>
           <a:xfrm>
             <a:off x="777240" y="4777560"/>
-            <a:ext cx="6211800" cy="4520160"/>
+            <a:ext cx="6211440" cy="4519800"/>
           </a:xfrm>
           <a:prstGeom prst="rect">
             <a:avLst/>
@@ -677,7 +677,7 @@
         <p:spPr>
           <a:xfrm>
             <a:off x="4399200" y="9555480"/>
-            <a:ext cx="3367080" cy="496800"/>
+            <a:ext cx="3366720" cy="496440"/>
           </a:xfrm>
           <a:prstGeom prst="rect">
             <a:avLst/>
@@ -719,7 +719,7 @@
                 <a:tab algn="l" pos="0"/>
               </a:tabLst>
             </a:pPr>
-            <a:fld id="{C472DD63-3DA9-4492-ACDC-4963FBEA8955}" type="slidenum">
+            <a:fld id="{AF04D3F4-6F2E-4523-AA38-BDB1DEDC3AF5}" type="slidenum">
               <a:rPr b="0" lang="de-DE" sz="1800" spc="-1" strike="noStrike">
                 <a:solidFill>
                   <a:srgbClr val="000000"/>
@@ -773,7 +773,7 @@
         <p:spPr>
           <a:xfrm>
             <a:off x="533520" y="763560"/>
-            <a:ext cx="6698160" cy="3766320"/>
+            <a:ext cx="6697800" cy="3765960"/>
           </a:xfrm>
           <a:prstGeom prst="rect">
             <a:avLst/>
@@ -796,7 +796,7 @@
         <p:spPr>
           <a:xfrm>
             <a:off x="777240" y="4777560"/>
-            <a:ext cx="6211800" cy="4520160"/>
+            <a:ext cx="6211440" cy="4519800"/>
           </a:xfrm>
           <a:prstGeom prst="rect">
             <a:avLst/>
@@ -836,7 +836,7 @@
         <p:spPr>
           <a:xfrm>
             <a:off x="4399200" y="9555480"/>
-            <a:ext cx="3367080" cy="496800"/>
+            <a:ext cx="3366720" cy="496440"/>
           </a:xfrm>
           <a:prstGeom prst="rect">
             <a:avLst/>
@@ -878,7 +878,7 @@
                 <a:tab algn="l" pos="0"/>
               </a:tabLst>
             </a:pPr>
-            <a:fld id="{DAF0C196-5A0F-4910-87F1-74690250FA06}" type="slidenum">
+            <a:fld id="{CF26F8F3-CEBE-4726-9E04-525186304CD4}" type="slidenum">
               <a:rPr b="0" lang="de-DE" sz="1800" spc="-1" strike="noStrike">
                 <a:solidFill>
                   <a:srgbClr val="000000"/>
@@ -932,7 +932,7 @@
         <p:spPr>
           <a:xfrm>
             <a:off x="533520" y="763560"/>
-            <a:ext cx="6698160" cy="3766320"/>
+            <a:ext cx="6697800" cy="3765960"/>
           </a:xfrm>
           <a:prstGeom prst="rect">
             <a:avLst/>
@@ -955,7 +955,7 @@
         <p:spPr>
           <a:xfrm>
             <a:off x="777240" y="4777560"/>
-            <a:ext cx="6211800" cy="4520160"/>
+            <a:ext cx="6211440" cy="4519800"/>
           </a:xfrm>
           <a:prstGeom prst="rect">
             <a:avLst/>
@@ -995,7 +995,7 @@
         <p:spPr>
           <a:xfrm>
             <a:off x="4399200" y="9555480"/>
-            <a:ext cx="3367080" cy="496800"/>
+            <a:ext cx="3366720" cy="496440"/>
           </a:xfrm>
           <a:prstGeom prst="rect">
             <a:avLst/>
@@ -1037,7 +1037,7 @@
                 <a:tab algn="l" pos="0"/>
               </a:tabLst>
             </a:pPr>
-            <a:fld id="{241B6649-B4BC-41A1-A91C-2F14B69B1CA8}" type="slidenum">
+            <a:fld id="{093AC081-2CE5-4F7B-A9B9-A2536A636B92}" type="slidenum">
               <a:rPr b="0" lang="de-DE" sz="1800" spc="-1" strike="noStrike">
                 <a:solidFill>
                   <a:srgbClr val="000000"/>
@@ -1091,7 +1091,7 @@
         <p:spPr>
           <a:xfrm>
             <a:off x="533520" y="763560"/>
-            <a:ext cx="6698160" cy="3766320"/>
+            <a:ext cx="6697800" cy="3765960"/>
           </a:xfrm>
           <a:prstGeom prst="rect">
             <a:avLst/>
@@ -1114,7 +1114,7 @@
         <p:spPr>
           <a:xfrm>
             <a:off x="777240" y="4777560"/>
-            <a:ext cx="6211800" cy="4520160"/>
+            <a:ext cx="6211440" cy="4519800"/>
           </a:xfrm>
           <a:prstGeom prst="rect">
             <a:avLst/>
@@ -1154,7 +1154,7 @@
         <p:spPr>
           <a:xfrm>
             <a:off x="4399200" y="9555480"/>
-            <a:ext cx="3367080" cy="496800"/>
+            <a:ext cx="3366720" cy="496440"/>
           </a:xfrm>
           <a:prstGeom prst="rect">
             <a:avLst/>
@@ -1196,7 +1196,7 @@
                 <a:tab algn="l" pos="0"/>
               </a:tabLst>
             </a:pPr>
-            <a:fld id="{E3B0E034-46E0-4583-B7EA-EF2373F1355C}" type="slidenum">
+            <a:fld id="{CE1A6EE5-74FD-4AA5-B964-1F2EA8207B9C}" type="slidenum">
               <a:rPr b="0" lang="de-DE" sz="1800" spc="-1" strike="noStrike">
                 <a:solidFill>
                   <a:srgbClr val="000000"/>
@@ -1250,7 +1250,7 @@
         <p:spPr>
           <a:xfrm>
             <a:off x="533520" y="763560"/>
-            <a:ext cx="6698160" cy="3766320"/>
+            <a:ext cx="6697800" cy="3765960"/>
           </a:xfrm>
           <a:prstGeom prst="rect">
             <a:avLst/>
@@ -1273,7 +1273,7 @@
         <p:spPr>
           <a:xfrm>
             <a:off x="777240" y="4777560"/>
-            <a:ext cx="6211800" cy="4520160"/>
+            <a:ext cx="6211440" cy="4519800"/>
           </a:xfrm>
           <a:prstGeom prst="rect">
             <a:avLst/>
@@ -1313,7 +1313,7 @@
         <p:spPr>
           <a:xfrm>
             <a:off x="4399200" y="9555480"/>
-            <a:ext cx="3367080" cy="496800"/>
+            <a:ext cx="3366720" cy="496440"/>
           </a:xfrm>
           <a:prstGeom prst="rect">
             <a:avLst/>
@@ -1355,7 +1355,7 @@
                 <a:tab algn="l" pos="0"/>
               </a:tabLst>
             </a:pPr>
-            <a:fld id="{C844CA7E-6FCF-479B-860E-9E5BC2694FE6}" type="slidenum">
+            <a:fld id="{2D4827FD-C643-4E21-BDA3-7602BE014D09}" type="slidenum">
               <a:rPr b="0" lang="de-DE" sz="1800" spc="-1" strike="noStrike">
                 <a:solidFill>
                   <a:srgbClr val="000000"/>
@@ -1409,7 +1409,7 @@
         <p:spPr>
           <a:xfrm>
             <a:off x="533520" y="763560"/>
-            <a:ext cx="6698160" cy="3766320"/>
+            <a:ext cx="6697800" cy="3765960"/>
           </a:xfrm>
           <a:prstGeom prst="rect">
             <a:avLst/>
@@ -1432,7 +1432,7 @@
         <p:spPr>
           <a:xfrm>
             <a:off x="777240" y="4777560"/>
-            <a:ext cx="6211800" cy="4520160"/>
+            <a:ext cx="6211440" cy="4519800"/>
           </a:xfrm>
           <a:prstGeom prst="rect">
             <a:avLst/>
@@ -1472,7 +1472,7 @@
         <p:spPr>
           <a:xfrm>
             <a:off x="4399200" y="9555480"/>
-            <a:ext cx="3367080" cy="496800"/>
+            <a:ext cx="3366720" cy="496440"/>
           </a:xfrm>
           <a:prstGeom prst="rect">
             <a:avLst/>
@@ -1514,7 +1514,7 @@
                 <a:tab algn="l" pos="0"/>
               </a:tabLst>
             </a:pPr>
-            <a:fld id="{D958CF93-5589-43BE-8C7C-F5759906FB56}" type="slidenum">
+            <a:fld id="{3FB24B12-89CB-4ECA-BBDD-4F6826F6C6AB}" type="slidenum">
               <a:rPr b="0" lang="de-DE" sz="1800" spc="-1" strike="noStrike">
                 <a:solidFill>
                   <a:srgbClr val="000000"/>
@@ -1568,7 +1568,7 @@
         <p:spPr>
           <a:xfrm>
             <a:off x="533520" y="763560"/>
-            <a:ext cx="6698520" cy="3766680"/>
+            <a:ext cx="6698160" cy="3766320"/>
           </a:xfrm>
           <a:prstGeom prst="rect">
             <a:avLst/>
@@ -1591,7 +1591,7 @@
         <p:spPr>
           <a:xfrm>
             <a:off x="777240" y="4777560"/>
-            <a:ext cx="6211800" cy="4520160"/>
+            <a:ext cx="6211440" cy="4519800"/>
           </a:xfrm>
           <a:prstGeom prst="rect">
             <a:avLst/>
@@ -1631,7 +1631,7 @@
         <p:spPr>
           <a:xfrm>
             <a:off x="4399200" y="9555480"/>
-            <a:ext cx="3367080" cy="496800"/>
+            <a:ext cx="3366720" cy="496440"/>
           </a:xfrm>
           <a:prstGeom prst="rect">
             <a:avLst/>
@@ -1673,7 +1673,7 @@
                 <a:tab algn="l" pos="0"/>
               </a:tabLst>
             </a:pPr>
-            <a:fld id="{482817F3-4B5B-49E1-807E-95CE6D1CC010}" type="slidenum">
+            <a:fld id="{FDD42728-F56D-4F9E-BD3F-B376A409BE6D}" type="slidenum">
               <a:rPr b="0" lang="de-DE" sz="1800" spc="-1" strike="noStrike">
                 <a:solidFill>
                   <a:srgbClr val="000000"/>
@@ -1727,7 +1727,7 @@
         <p:spPr>
           <a:xfrm>
             <a:off x="533520" y="763560"/>
-            <a:ext cx="6698160" cy="3766320"/>
+            <a:ext cx="6697800" cy="3765960"/>
           </a:xfrm>
           <a:prstGeom prst="rect">
             <a:avLst/>
@@ -1750,7 +1750,7 @@
         <p:spPr>
           <a:xfrm>
             <a:off x="777240" y="4777560"/>
-            <a:ext cx="6211800" cy="4520160"/>
+            <a:ext cx="6211440" cy="4519800"/>
           </a:xfrm>
           <a:prstGeom prst="rect">
             <a:avLst/>
@@ -1790,7 +1790,7 @@
         <p:spPr>
           <a:xfrm>
             <a:off x="4399200" y="9555480"/>
-            <a:ext cx="3367080" cy="496800"/>
+            <a:ext cx="3366720" cy="496440"/>
           </a:xfrm>
           <a:prstGeom prst="rect">
             <a:avLst/>
@@ -1832,7 +1832,7 @@
                 <a:tab algn="l" pos="0"/>
               </a:tabLst>
             </a:pPr>
-            <a:fld id="{6168F3F8-6F27-4A87-AD08-6DD79C6B28F6}" type="slidenum">
+            <a:fld id="{5E8AAA76-F682-4650-9F47-424DFB9C32C7}" type="slidenum">
               <a:rPr b="0" lang="de-DE" sz="1800" spc="-1" strike="noStrike">
                 <a:solidFill>
                   <a:srgbClr val="000000"/>
@@ -1886,7 +1886,7 @@
         <p:spPr>
           <a:xfrm>
             <a:off x="533520" y="763560"/>
-            <a:ext cx="6698160" cy="3766320"/>
+            <a:ext cx="6697800" cy="3765960"/>
           </a:xfrm>
           <a:prstGeom prst="rect">
             <a:avLst/>
@@ -1909,7 +1909,7 @@
         <p:spPr>
           <a:xfrm>
             <a:off x="777240" y="4777560"/>
-            <a:ext cx="6211800" cy="4520160"/>
+            <a:ext cx="6211440" cy="4519800"/>
           </a:xfrm>
           <a:prstGeom prst="rect">
             <a:avLst/>
@@ -1949,7 +1949,7 @@
         <p:spPr>
           <a:xfrm>
             <a:off x="4399200" y="9555480"/>
-            <a:ext cx="3367080" cy="496800"/>
+            <a:ext cx="3366720" cy="496440"/>
           </a:xfrm>
           <a:prstGeom prst="rect">
             <a:avLst/>
@@ -1991,7 +1991,7 @@
                 <a:tab algn="l" pos="0"/>
               </a:tabLst>
             </a:pPr>
-            <a:fld id="{2DE61581-53FB-4334-BA25-1DD37C10E8F2}" type="slidenum">
+            <a:fld id="{99C30465-08D5-44F1-9B33-DEACC896969D}" type="slidenum">
               <a:rPr b="0" lang="de-DE" sz="1800" spc="-1" strike="noStrike">
                 <a:solidFill>
                   <a:srgbClr val="000000"/>
@@ -2045,7 +2045,7 @@
         <p:spPr>
           <a:xfrm>
             <a:off x="533520" y="763560"/>
-            <a:ext cx="6698160" cy="3766320"/>
+            <a:ext cx="6697800" cy="3765960"/>
           </a:xfrm>
           <a:prstGeom prst="rect">
             <a:avLst/>
@@ -2068,7 +2068,7 @@
         <p:spPr>
           <a:xfrm>
             <a:off x="777240" y="4777560"/>
-            <a:ext cx="6211800" cy="4520160"/>
+            <a:ext cx="6211440" cy="4519800"/>
           </a:xfrm>
           <a:prstGeom prst="rect">
             <a:avLst/>
@@ -2108,7 +2108,7 @@
         <p:spPr>
           <a:xfrm>
             <a:off x="4399200" y="9555480"/>
-            <a:ext cx="3367080" cy="496800"/>
+            <a:ext cx="3366720" cy="496440"/>
           </a:xfrm>
           <a:prstGeom prst="rect">
             <a:avLst/>
@@ -2150,7 +2150,7 @@
                 <a:tab algn="l" pos="0"/>
               </a:tabLst>
             </a:pPr>
-            <a:fld id="{4ABF4585-5385-4B9D-BA81-3B2D5A8F4E21}" type="slidenum">
+            <a:fld id="{C7365F62-745C-4946-9B33-8E70257AE79C}" type="slidenum">
               <a:rPr b="0" lang="de-DE" sz="1800" spc="-1" strike="noStrike">
                 <a:solidFill>
                   <a:srgbClr val="000000"/>
@@ -2204,7 +2204,7 @@
         <p:spPr>
           <a:xfrm>
             <a:off x="533520" y="763560"/>
-            <a:ext cx="6698160" cy="3766320"/>
+            <a:ext cx="6697800" cy="3765960"/>
           </a:xfrm>
           <a:prstGeom prst="rect">
             <a:avLst/>
@@ -2227,7 +2227,7 @@
         <p:spPr>
           <a:xfrm>
             <a:off x="777240" y="4777560"/>
-            <a:ext cx="6211800" cy="4520160"/>
+            <a:ext cx="6211440" cy="4519800"/>
           </a:xfrm>
           <a:prstGeom prst="rect">
             <a:avLst/>
@@ -2267,7 +2267,7 @@
         <p:spPr>
           <a:xfrm>
             <a:off x="4399200" y="9555480"/>
-            <a:ext cx="3367080" cy="496800"/>
+            <a:ext cx="3366720" cy="496440"/>
           </a:xfrm>
           <a:prstGeom prst="rect">
             <a:avLst/>
@@ -2309,7 +2309,7 @@
                 <a:tab algn="l" pos="0"/>
               </a:tabLst>
             </a:pPr>
-            <a:fld id="{88988CB4-67AB-4C8C-827C-6E7F90A43F9F}" type="slidenum">
+            <a:fld id="{0F6BC577-5E19-4EB2-92B4-A4056BFF5AFA}" type="slidenum">
               <a:rPr b="0" lang="de-DE" sz="1800" spc="-1" strike="noStrike">
                 <a:solidFill>
                   <a:srgbClr val="000000"/>
@@ -2363,7 +2363,7 @@
         <p:spPr>
           <a:xfrm>
             <a:off x="533520" y="763560"/>
-            <a:ext cx="6698160" cy="3766320"/>
+            <a:ext cx="6697800" cy="3765960"/>
           </a:xfrm>
           <a:prstGeom prst="rect">
             <a:avLst/>
@@ -2386,7 +2386,7 @@
         <p:spPr>
           <a:xfrm>
             <a:off x="777240" y="4777560"/>
-            <a:ext cx="6211800" cy="4520160"/>
+            <a:ext cx="6211440" cy="4519800"/>
           </a:xfrm>
           <a:prstGeom prst="rect">
             <a:avLst/>
@@ -2426,7 +2426,7 @@
         <p:spPr>
           <a:xfrm>
             <a:off x="4399200" y="9555480"/>
-            <a:ext cx="3367080" cy="496800"/>
+            <a:ext cx="3366720" cy="496440"/>
           </a:xfrm>
           <a:prstGeom prst="rect">
             <a:avLst/>
@@ -2468,7 +2468,7 @@
                 <a:tab algn="l" pos="0"/>
               </a:tabLst>
             </a:pPr>
-            <a:fld id="{C35B048F-856A-4740-BA09-867D9BF262D4}" type="slidenum">
+            <a:fld id="{2D06308A-EA7B-4468-AE4E-FF83F2D66630}" type="slidenum">
               <a:rPr b="0" lang="de-DE" sz="1800" spc="-1" strike="noStrike">
                 <a:solidFill>
                   <a:srgbClr val="000000"/>
@@ -2522,7 +2522,7 @@
         <p:spPr>
           <a:xfrm>
             <a:off x="533520" y="763560"/>
-            <a:ext cx="6698160" cy="3766320"/>
+            <a:ext cx="6697800" cy="3765960"/>
           </a:xfrm>
           <a:prstGeom prst="rect">
             <a:avLst/>
@@ -2545,7 +2545,7 @@
         <p:spPr>
           <a:xfrm>
             <a:off x="777240" y="4777560"/>
-            <a:ext cx="6211800" cy="4520160"/>
+            <a:ext cx="6211440" cy="4519800"/>
           </a:xfrm>
           <a:prstGeom prst="rect">
             <a:avLst/>
@@ -2585,7 +2585,7 @@
         <p:spPr>
           <a:xfrm>
             <a:off x="4399200" y="9555480"/>
-            <a:ext cx="3367080" cy="496800"/>
+            <a:ext cx="3366720" cy="496440"/>
           </a:xfrm>
           <a:prstGeom prst="rect">
             <a:avLst/>
@@ -2627,7 +2627,7 @@
                 <a:tab algn="l" pos="0"/>
               </a:tabLst>
             </a:pPr>
-            <a:fld id="{44DE26B9-4536-40A1-8353-1A27D8C56BA3}" type="slidenum">
+            <a:fld id="{23DFD8C9-BF7C-4E68-BD72-6E7066C5006D}" type="slidenum">
               <a:rPr b="0" lang="de-DE" sz="1800" spc="-1" strike="noStrike">
                 <a:solidFill>
                   <a:srgbClr val="000000"/>
@@ -2681,7 +2681,7 @@
         <p:spPr>
           <a:xfrm>
             <a:off x="533520" y="763560"/>
-            <a:ext cx="6698160" cy="3766320"/>
+            <a:ext cx="6697800" cy="3765960"/>
           </a:xfrm>
           <a:prstGeom prst="rect">
             <a:avLst/>
@@ -2704,7 +2704,7 @@
         <p:spPr>
           <a:xfrm>
             <a:off x="777240" y="4777560"/>
-            <a:ext cx="6211800" cy="4520160"/>
+            <a:ext cx="6211440" cy="4519800"/>
           </a:xfrm>
           <a:prstGeom prst="rect">
             <a:avLst/>
@@ -2744,7 +2744,7 @@
         <p:spPr>
           <a:xfrm>
             <a:off x="4399200" y="9555480"/>
-            <a:ext cx="3367080" cy="496800"/>
+            <a:ext cx="3366720" cy="496440"/>
           </a:xfrm>
           <a:prstGeom prst="rect">
             <a:avLst/>
@@ -2786,7 +2786,7 @@
                 <a:tab algn="l" pos="0"/>
               </a:tabLst>
             </a:pPr>
-            <a:fld id="{5E63097C-660B-4B87-82E0-0B0BE6191F84}" type="slidenum">
+            <a:fld id="{A3053932-4293-4B47-AAB9-C0390D6A0F0A}" type="slidenum">
               <a:rPr b="0" lang="de-DE" sz="1800" spc="-1" strike="noStrike">
                 <a:solidFill>
                   <a:srgbClr val="000000"/>
@@ -2840,7 +2840,7 @@
         <p:spPr>
           <a:xfrm>
             <a:off x="533520" y="763560"/>
-            <a:ext cx="6698160" cy="3766320"/>
+            <a:ext cx="6697800" cy="3765960"/>
           </a:xfrm>
           <a:prstGeom prst="rect">
             <a:avLst/>
@@ -2863,7 +2863,7 @@
         <p:spPr>
           <a:xfrm>
             <a:off x="777240" y="4777560"/>
-            <a:ext cx="6211800" cy="4520160"/>
+            <a:ext cx="6211440" cy="4519800"/>
           </a:xfrm>
           <a:prstGeom prst="rect">
             <a:avLst/>
@@ -2903,7 +2903,7 @@
         <p:spPr>
           <a:xfrm>
             <a:off x="4399200" y="9555480"/>
-            <a:ext cx="3367080" cy="496800"/>
+            <a:ext cx="3366720" cy="496440"/>
           </a:xfrm>
           <a:prstGeom prst="rect">
             <a:avLst/>
@@ -2945,7 +2945,7 @@
                 <a:tab algn="l" pos="0"/>
               </a:tabLst>
             </a:pPr>
-            <a:fld id="{74854416-E245-4BB4-910E-6983910B843D}" type="slidenum">
+            <a:fld id="{4C9FC663-268A-4EEE-9603-14605D50CB7B}" type="slidenum">
               <a:rPr b="0" lang="de-DE" sz="1800" spc="-1" strike="noStrike">
                 <a:solidFill>
                   <a:srgbClr val="000000"/>
@@ -2999,7 +2999,7 @@
         <p:spPr>
           <a:xfrm>
             <a:off x="533520" y="763560"/>
-            <a:ext cx="6698160" cy="3766320"/>
+            <a:ext cx="6697800" cy="3765960"/>
           </a:xfrm>
           <a:prstGeom prst="rect">
             <a:avLst/>
@@ -3022,7 +3022,7 @@
         <p:spPr>
           <a:xfrm>
             <a:off x="777240" y="4777560"/>
-            <a:ext cx="6211800" cy="4520160"/>
+            <a:ext cx="6211440" cy="4519800"/>
           </a:xfrm>
           <a:prstGeom prst="rect">
             <a:avLst/>
@@ -3062,7 +3062,7 @@
         <p:spPr>
           <a:xfrm>
             <a:off x="4399200" y="9555480"/>
-            <a:ext cx="3367080" cy="496800"/>
+            <a:ext cx="3366720" cy="496440"/>
           </a:xfrm>
           <a:prstGeom prst="rect">
             <a:avLst/>
@@ -3104,7 +3104,7 @@
                 <a:tab algn="l" pos="0"/>
               </a:tabLst>
             </a:pPr>
-            <a:fld id="{5F59DBB5-0DA4-4740-AC8D-0F8635E184D2}" type="slidenum">
+            <a:fld id="{804CB902-B730-493A-9FEB-3DD79F4E2327}" type="slidenum">
               <a:rPr b="0" lang="de-DE" sz="1800" spc="-1" strike="noStrike">
                 <a:solidFill>
                   <a:srgbClr val="000000"/>
@@ -3158,7 +3158,7 @@
         <p:spPr>
           <a:xfrm>
             <a:off x="533520" y="763560"/>
-            <a:ext cx="6698160" cy="3766320"/>
+            <a:ext cx="6697800" cy="3765960"/>
           </a:xfrm>
           <a:prstGeom prst="rect">
             <a:avLst/>
@@ -3181,7 +3181,7 @@
         <p:spPr>
           <a:xfrm>
             <a:off x="777240" y="4777560"/>
-            <a:ext cx="6211800" cy="4520160"/>
+            <a:ext cx="6211440" cy="4519800"/>
           </a:xfrm>
           <a:prstGeom prst="rect">
             <a:avLst/>
@@ -3221,7 +3221,7 @@
         <p:spPr>
           <a:xfrm>
             <a:off x="4399200" y="9555480"/>
-            <a:ext cx="3367080" cy="496800"/>
+            <a:ext cx="3366720" cy="496440"/>
           </a:xfrm>
           <a:prstGeom prst="rect">
             <a:avLst/>
@@ -3263,7 +3263,7 @@
                 <a:tab algn="l" pos="0"/>
               </a:tabLst>
             </a:pPr>
-            <a:fld id="{ECDACACD-0E4A-4825-9B7A-A3D597D46C65}" type="slidenum">
+            <a:fld id="{E0D34D3F-14E8-45AC-A36B-E2BC3C8C40A3}" type="slidenum">
               <a:rPr b="0" lang="de-DE" sz="1800" spc="-1" strike="noStrike">
                 <a:solidFill>
                   <a:srgbClr val="000000"/>
@@ -3317,7 +3317,7 @@
         <p:spPr>
           <a:xfrm>
             <a:off x="533520" y="763560"/>
-            <a:ext cx="6698160" cy="3766320"/>
+            <a:ext cx="6697800" cy="3765960"/>
           </a:xfrm>
           <a:prstGeom prst="rect">
             <a:avLst/>
@@ -3340,7 +3340,7 @@
         <p:spPr>
           <a:xfrm>
             <a:off x="777240" y="4777560"/>
-            <a:ext cx="6211800" cy="4520160"/>
+            <a:ext cx="6211440" cy="4519800"/>
           </a:xfrm>
           <a:prstGeom prst="rect">
             <a:avLst/>
@@ -3380,7 +3380,7 @@
         <p:spPr>
           <a:xfrm>
             <a:off x="4399200" y="9555480"/>
-            <a:ext cx="3367080" cy="496800"/>
+            <a:ext cx="3366720" cy="496440"/>
           </a:xfrm>
           <a:prstGeom prst="rect">
             <a:avLst/>
@@ -3422,7 +3422,7 @@
                 <a:tab algn="l" pos="0"/>
               </a:tabLst>
             </a:pPr>
-            <a:fld id="{095FF59B-B4AF-47A2-A919-94A57C3FF281}" type="slidenum">
+            <a:fld id="{529B327A-E806-4D53-A3DE-F6EBB51FFEE4}" type="slidenum">
               <a:rPr b="0" lang="de-DE" sz="1800" spc="-1" strike="noStrike">
                 <a:solidFill>
                   <a:srgbClr val="000000"/>
@@ -3476,7 +3476,7 @@
         <p:spPr>
           <a:xfrm>
             <a:off x="533520" y="763560"/>
-            <a:ext cx="6698160" cy="3766320"/>
+            <a:ext cx="6697800" cy="3765960"/>
           </a:xfrm>
           <a:prstGeom prst="rect">
             <a:avLst/>
@@ -3499,7 +3499,7 @@
         <p:spPr>
           <a:xfrm>
             <a:off x="777240" y="4777560"/>
-            <a:ext cx="6211800" cy="4520160"/>
+            <a:ext cx="6211440" cy="4519800"/>
           </a:xfrm>
           <a:prstGeom prst="rect">
             <a:avLst/>
@@ -3539,7 +3539,7 @@
         <p:spPr>
           <a:xfrm>
             <a:off x="4399200" y="9555480"/>
-            <a:ext cx="3367080" cy="496800"/>
+            <a:ext cx="3366720" cy="496440"/>
           </a:xfrm>
           <a:prstGeom prst="rect">
             <a:avLst/>
@@ -3581,7 +3581,7 @@
                 <a:tab algn="l" pos="0"/>
               </a:tabLst>
             </a:pPr>
-            <a:fld id="{5BC84A56-2D4F-4DAC-BA5E-578F21891EBA}" type="slidenum">
+            <a:fld id="{D65EF8FA-5A55-4F88-9213-B8C0178975CA}" type="slidenum">
               <a:rPr b="0" lang="de-DE" sz="1800" spc="-1" strike="noStrike">
                 <a:solidFill>
                   <a:srgbClr val="000000"/>
@@ -3635,7 +3635,7 @@
         <p:spPr>
           <a:xfrm>
             <a:off x="533520" y="763560"/>
-            <a:ext cx="6698160" cy="3766320"/>
+            <a:ext cx="6697800" cy="3765960"/>
           </a:xfrm>
           <a:prstGeom prst="rect">
             <a:avLst/>
@@ -3658,7 +3658,7 @@
         <p:spPr>
           <a:xfrm>
             <a:off x="777240" y="4777560"/>
-            <a:ext cx="6211800" cy="4520160"/>
+            <a:ext cx="6211440" cy="4519800"/>
           </a:xfrm>
           <a:prstGeom prst="rect">
             <a:avLst/>
@@ -3698,7 +3698,7 @@
         <p:spPr>
           <a:xfrm>
             <a:off x="4399200" y="9555480"/>
-            <a:ext cx="3367080" cy="496800"/>
+            <a:ext cx="3366720" cy="496440"/>
           </a:xfrm>
           <a:prstGeom prst="rect">
             <a:avLst/>
@@ -3740,7 +3740,7 @@
                 <a:tab algn="l" pos="0"/>
               </a:tabLst>
             </a:pPr>
-            <a:fld id="{B829878E-1CFC-4EA8-9EBB-CB5BDE18ECDE}" type="slidenum">
+            <a:fld id="{FA4E329B-2BCB-46F3-A876-AB4E7F413773}" type="slidenum">
               <a:rPr b="0" lang="de-DE" sz="1800" spc="-1" strike="noStrike">
                 <a:solidFill>
                   <a:srgbClr val="000000"/>
@@ -3794,7 +3794,7 @@
         <p:spPr>
           <a:xfrm>
             <a:off x="533520" y="763560"/>
-            <a:ext cx="6698160" cy="3766320"/>
+            <a:ext cx="6697800" cy="3765960"/>
           </a:xfrm>
           <a:prstGeom prst="rect">
             <a:avLst/>
@@ -3817,7 +3817,7 @@
         <p:spPr>
           <a:xfrm>
             <a:off x="777240" y="4777560"/>
-            <a:ext cx="6211800" cy="4520160"/>
+            <a:ext cx="6211440" cy="4519800"/>
           </a:xfrm>
           <a:prstGeom prst="rect">
             <a:avLst/>
@@ -3857,7 +3857,7 @@
         <p:spPr>
           <a:xfrm>
             <a:off x="4399200" y="9555480"/>
-            <a:ext cx="3367080" cy="496800"/>
+            <a:ext cx="3366720" cy="496440"/>
           </a:xfrm>
           <a:prstGeom prst="rect">
             <a:avLst/>
@@ -3899,7 +3899,7 @@
                 <a:tab algn="l" pos="0"/>
               </a:tabLst>
             </a:pPr>
-            <a:fld id="{A77DC0D9-1815-4DD0-AAC9-0278B6C21005}" type="slidenum">
+            <a:fld id="{987CE226-62B5-4651-8A6B-02E13159B381}" type="slidenum">
               <a:rPr b="0" lang="de-DE" sz="1800" spc="-1" strike="noStrike">
                 <a:solidFill>
                   <a:srgbClr val="000000"/>
@@ -3953,7 +3953,7 @@
         <p:spPr>
           <a:xfrm>
             <a:off x="533520" y="763560"/>
-            <a:ext cx="6698520" cy="3766680"/>
+            <a:ext cx="6698160" cy="3766320"/>
           </a:xfrm>
           <a:prstGeom prst="rect">
             <a:avLst/>
@@ -3976,7 +3976,7 @@
         <p:spPr>
           <a:xfrm>
             <a:off x="777240" y="4777560"/>
-            <a:ext cx="6211800" cy="4520160"/>
+            <a:ext cx="6211440" cy="4519800"/>
           </a:xfrm>
           <a:prstGeom prst="rect">
             <a:avLst/>
@@ -4016,7 +4016,7 @@
         <p:spPr>
           <a:xfrm>
             <a:off x="4399200" y="9555480"/>
-            <a:ext cx="3367080" cy="496800"/>
+            <a:ext cx="3366720" cy="496440"/>
           </a:xfrm>
           <a:prstGeom prst="rect">
             <a:avLst/>
@@ -4058,7 +4058,7 @@
                 <a:tab algn="l" pos="0"/>
               </a:tabLst>
             </a:pPr>
-            <a:fld id="{0D6C5D60-E40C-44CF-A6CF-E94AF95B9EA1}" type="slidenum">
+            <a:fld id="{CE2E920D-8779-4D83-B5BB-2E363982B373}" type="slidenum">
               <a:rPr b="0" lang="de-DE" sz="1800" spc="-1" strike="noStrike">
                 <a:solidFill>
                   <a:srgbClr val="000000"/>
@@ -4112,7 +4112,7 @@
         <p:spPr>
           <a:xfrm>
             <a:off x="533520" y="763560"/>
-            <a:ext cx="6698520" cy="3766680"/>
+            <a:ext cx="6698160" cy="3766320"/>
           </a:xfrm>
           <a:prstGeom prst="rect">
             <a:avLst/>
@@ -4135,7 +4135,7 @@
         <p:spPr>
           <a:xfrm>
             <a:off x="777240" y="4777560"/>
-            <a:ext cx="6211800" cy="4520160"/>
+            <a:ext cx="6211440" cy="4519800"/>
           </a:xfrm>
           <a:prstGeom prst="rect">
             <a:avLst/>
@@ -4175,7 +4175,7 @@
         <p:spPr>
           <a:xfrm>
             <a:off x="4399200" y="9555480"/>
-            <a:ext cx="3367080" cy="496800"/>
+            <a:ext cx="3366720" cy="496440"/>
           </a:xfrm>
           <a:prstGeom prst="rect">
             <a:avLst/>
@@ -4217,7 +4217,7 @@
                 <a:tab algn="l" pos="0"/>
               </a:tabLst>
             </a:pPr>
-            <a:fld id="{D08006C5-28E7-4898-A0F8-455695A53490}" type="slidenum">
+            <a:fld id="{5D38FC39-4E6B-485B-B5A5-FC6C42A138AA}" type="slidenum">
               <a:rPr b="0" lang="de-DE" sz="1800" spc="-1" strike="noStrike">
                 <a:solidFill>
                   <a:srgbClr val="000000"/>
@@ -4271,7 +4271,7 @@
         <p:spPr>
           <a:xfrm>
             <a:off x="533520" y="763560"/>
-            <a:ext cx="6698520" cy="3766680"/>
+            <a:ext cx="6698160" cy="3766320"/>
           </a:xfrm>
           <a:prstGeom prst="rect">
             <a:avLst/>
@@ -4294,7 +4294,7 @@
         <p:spPr>
           <a:xfrm>
             <a:off x="777240" y="4777560"/>
-            <a:ext cx="6211800" cy="4520160"/>
+            <a:ext cx="6211440" cy="4519800"/>
           </a:xfrm>
           <a:prstGeom prst="rect">
             <a:avLst/>
@@ -4334,7 +4334,7 @@
         <p:spPr>
           <a:xfrm>
             <a:off x="4399200" y="9555480"/>
-            <a:ext cx="3367080" cy="496800"/>
+            <a:ext cx="3366720" cy="496440"/>
           </a:xfrm>
           <a:prstGeom prst="rect">
             <a:avLst/>
@@ -4376,7 +4376,7 @@
                 <a:tab algn="l" pos="0"/>
               </a:tabLst>
             </a:pPr>
-            <a:fld id="{013B9090-D510-407E-A674-62682D92EBE9}" type="slidenum">
+            <a:fld id="{1555A9E8-CEE5-4901-A5AE-3D07C1DA2BEC}" type="slidenum">
               <a:rPr b="0" lang="de-DE" sz="1800" spc="-1" strike="noStrike">
                 <a:solidFill>
                   <a:srgbClr val="000000"/>
@@ -4430,7 +4430,7 @@
         <p:spPr>
           <a:xfrm>
             <a:off x="533520" y="763560"/>
-            <a:ext cx="6698520" cy="3766680"/>
+            <a:ext cx="6698160" cy="3766320"/>
           </a:xfrm>
           <a:prstGeom prst="rect">
             <a:avLst/>
@@ -4453,7 +4453,7 @@
         <p:spPr>
           <a:xfrm>
             <a:off x="777240" y="4777560"/>
-            <a:ext cx="6211800" cy="4520160"/>
+            <a:ext cx="6211440" cy="4519800"/>
           </a:xfrm>
           <a:prstGeom prst="rect">
             <a:avLst/>
@@ -4493,7 +4493,7 @@
         <p:spPr>
           <a:xfrm>
             <a:off x="4399200" y="9555480"/>
-            <a:ext cx="3367080" cy="496800"/>
+            <a:ext cx="3366720" cy="496440"/>
           </a:xfrm>
           <a:prstGeom prst="rect">
             <a:avLst/>
@@ -4535,7 +4535,7 @@
                 <a:tab algn="l" pos="0"/>
               </a:tabLst>
             </a:pPr>
-            <a:fld id="{107427A9-5FF4-4A72-95CE-C95FE2D2B0D6}" type="slidenum">
+            <a:fld id="{157BF8FD-9C3D-4EC0-B3E9-DC22C9FE3E4A}" type="slidenum">
               <a:rPr b="0" lang="de-DE" sz="1800" spc="-1" strike="noStrike">
                 <a:solidFill>
                   <a:srgbClr val="000000"/>
@@ -4589,7 +4589,7 @@
         <p:spPr>
           <a:xfrm>
             <a:off x="533520" y="763560"/>
-            <a:ext cx="6698520" cy="3766680"/>
+            <a:ext cx="6698160" cy="3766320"/>
           </a:xfrm>
           <a:prstGeom prst="rect">
             <a:avLst/>
@@ -4612,7 +4612,7 @@
         <p:spPr>
           <a:xfrm>
             <a:off x="777240" y="4777560"/>
-            <a:ext cx="6211800" cy="4520160"/>
+            <a:ext cx="6211440" cy="4519800"/>
           </a:xfrm>
           <a:prstGeom prst="rect">
             <a:avLst/>
@@ -4652,7 +4652,7 @@
         <p:spPr>
           <a:xfrm>
             <a:off x="4399200" y="9555480"/>
-            <a:ext cx="3367080" cy="496800"/>
+            <a:ext cx="3366720" cy="496440"/>
           </a:xfrm>
           <a:prstGeom prst="rect">
             <a:avLst/>
@@ -4694,7 +4694,7 @@
                 <a:tab algn="l" pos="0"/>
               </a:tabLst>
             </a:pPr>
-            <a:fld id="{15D39733-ECB5-4816-923B-B14ABF2B857E}" type="slidenum">
+            <a:fld id="{94143ACC-4A77-4925-A414-760BF3299809}" type="slidenum">
               <a:rPr b="0" lang="de-DE" sz="1800" spc="-1" strike="noStrike">
                 <a:solidFill>
                   <a:srgbClr val="000000"/>
@@ -4748,7 +4748,7 @@
         <p:spPr>
           <a:xfrm>
             <a:off x="533520" y="763560"/>
-            <a:ext cx="6698520" cy="3766680"/>
+            <a:ext cx="6698160" cy="3766320"/>
           </a:xfrm>
           <a:prstGeom prst="rect">
             <a:avLst/>
@@ -4771,7 +4771,7 @@
         <p:spPr>
           <a:xfrm>
             <a:off x="777240" y="4777560"/>
-            <a:ext cx="6211800" cy="4520160"/>
+            <a:ext cx="6211440" cy="4519800"/>
           </a:xfrm>
           <a:prstGeom prst="rect">
             <a:avLst/>
@@ -4811,7 +4811,7 @@
         <p:spPr>
           <a:xfrm>
             <a:off x="4399200" y="9555480"/>
-            <a:ext cx="3367080" cy="496800"/>
+            <a:ext cx="3366720" cy="496440"/>
           </a:xfrm>
           <a:prstGeom prst="rect">
             <a:avLst/>
@@ -4853,7 +4853,7 @@
                 <a:tab algn="l" pos="0"/>
               </a:tabLst>
             </a:pPr>
-            <a:fld id="{7C3766CB-3E1D-4890-8D93-45A6FB131E60}" type="slidenum">
+            <a:fld id="{3A13E111-E0AA-467B-962F-52F7177F0B34}" type="slidenum">
               <a:rPr b="0" lang="de-DE" sz="1800" spc="-1" strike="noStrike">
                 <a:solidFill>
                   <a:srgbClr val="000000"/>
@@ -4907,7 +4907,7 @@
         <p:spPr>
           <a:xfrm>
             <a:off x="533520" y="763560"/>
-            <a:ext cx="6698520" cy="3766680"/>
+            <a:ext cx="6698160" cy="3766320"/>
           </a:xfrm>
           <a:prstGeom prst="rect">
             <a:avLst/>
@@ -4930,7 +4930,7 @@
         <p:spPr>
           <a:xfrm>
             <a:off x="777240" y="4777560"/>
-            <a:ext cx="6211800" cy="4520160"/>
+            <a:ext cx="6211440" cy="4519800"/>
           </a:xfrm>
           <a:prstGeom prst="rect">
             <a:avLst/>
@@ -4970,7 +4970,7 @@
         <p:spPr>
           <a:xfrm>
             <a:off x="4399200" y="9555480"/>
-            <a:ext cx="3367080" cy="496800"/>
+            <a:ext cx="3366720" cy="496440"/>
           </a:xfrm>
           <a:prstGeom prst="rect">
             <a:avLst/>
@@ -5012,7 +5012,7 @@
                 <a:tab algn="l" pos="0"/>
               </a:tabLst>
             </a:pPr>
-            <a:fld id="{9B2F8551-9ABE-4648-8BCC-30E4E234290B}" type="slidenum">
+            <a:fld id="{4025F782-A41D-4513-907C-B0A4F4CDD72C}" type="slidenum">
               <a:rPr b="0" lang="de-DE" sz="1800" spc="-1" strike="noStrike">
                 <a:solidFill>
                   <a:srgbClr val="000000"/>
@@ -5066,7 +5066,7 @@
         <p:spPr>
           <a:xfrm>
             <a:off x="533520" y="763560"/>
-            <a:ext cx="6698160" cy="3766320"/>
+            <a:ext cx="6697800" cy="3765960"/>
           </a:xfrm>
           <a:prstGeom prst="rect">
             <a:avLst/>
@@ -5089,7 +5089,7 @@
         <p:spPr>
           <a:xfrm>
             <a:off x="777240" y="4777560"/>
-            <a:ext cx="6211800" cy="4520160"/>
+            <a:ext cx="6211440" cy="4519800"/>
           </a:xfrm>
           <a:prstGeom prst="rect">
             <a:avLst/>
@@ -5129,7 +5129,7 @@
         <p:spPr>
           <a:xfrm>
             <a:off x="4399200" y="9555480"/>
-            <a:ext cx="3367080" cy="496800"/>
+            <a:ext cx="3366720" cy="496440"/>
           </a:xfrm>
           <a:prstGeom prst="rect">
             <a:avLst/>
@@ -5171,7 +5171,7 @@
                 <a:tab algn="l" pos="0"/>
               </a:tabLst>
             </a:pPr>
-            <a:fld id="{0029967F-34DC-46CA-BBB3-9A7FB7A13796}" type="slidenum">
+            <a:fld id="{D354DAB2-217C-43A0-8540-E17F26AF7793}" type="slidenum">
               <a:rPr b="0" lang="de-DE" sz="1800" spc="-1" strike="noStrike">
                 <a:solidFill>
                   <a:srgbClr val="000000"/>
@@ -5225,7 +5225,7 @@
         <p:spPr>
           <a:xfrm>
             <a:off x="533520" y="763560"/>
-            <a:ext cx="6698160" cy="3766320"/>
+            <a:ext cx="6697800" cy="3765960"/>
           </a:xfrm>
           <a:prstGeom prst="rect">
             <a:avLst/>
@@ -5248,7 +5248,7 @@
         <p:spPr>
           <a:xfrm>
             <a:off x="777240" y="4777560"/>
-            <a:ext cx="6211800" cy="4520160"/>
+            <a:ext cx="6211440" cy="4519800"/>
           </a:xfrm>
           <a:prstGeom prst="rect">
             <a:avLst/>
@@ -5288,7 +5288,7 @@
         <p:spPr>
           <a:xfrm>
             <a:off x="4399200" y="9555480"/>
-            <a:ext cx="3367080" cy="496800"/>
+            <a:ext cx="3366720" cy="496440"/>
           </a:xfrm>
           <a:prstGeom prst="rect">
             <a:avLst/>
@@ -5330,7 +5330,7 @@
                 <a:tab algn="l" pos="0"/>
               </a:tabLst>
             </a:pPr>
-            <a:fld id="{5C153C11-8BB3-414B-BA5F-FD39890CBA11}" type="slidenum">
+            <a:fld id="{4577C46A-1000-4944-B769-DE8AC0F7A7E6}" type="slidenum">
               <a:rPr b="0" lang="de-DE" sz="1800" spc="-1" strike="noStrike">
                 <a:solidFill>
                   <a:srgbClr val="000000"/>
@@ -12483,7 +12483,7 @@
         <p:spPr>
           <a:xfrm>
             <a:off x="11444760" y="0"/>
-            <a:ext cx="739440" cy="6848280"/>
+            <a:ext cx="739080" cy="6847920"/>
           </a:xfrm>
           <a:prstGeom prst="rect">
             <a:avLst/>
@@ -12532,7 +12532,7 @@
         <p:spPr>
           <a:xfrm>
             <a:off x="11438640" y="6453360"/>
-            <a:ext cx="756360" cy="363960"/>
+            <a:ext cx="756000" cy="363960"/>
           </a:xfrm>
           <a:prstGeom prst="rect">
             <a:avLst/>
@@ -12558,7 +12558,7 @@
                 <a:spcPct val="100000"/>
               </a:lnSpc>
             </a:pPr>
-            <a:fld id="{99523FA1-D2F5-4CF9-B939-0866484BF724}" type="slidenum">
+            <a:fld id="{45982AE2-5742-4173-8A1F-034536DA4D83}" type="slidenum">
               <a:rPr b="0" lang="en-US" sz="1800" spc="-1" strike="noStrike">
                 <a:solidFill>
                   <a:srgbClr val="808080"/>
@@ -12586,7 +12586,7 @@
         <p:spPr>
           <a:xfrm>
             <a:off x="912240" y="1268280"/>
-            <a:ext cx="9206280" cy="359640"/>
+            <a:ext cx="9205920" cy="359280"/>
           </a:xfrm>
           <a:prstGeom prst="rect">
             <a:avLst/>
@@ -12635,7 +12635,7 @@
         <p:spPr>
           <a:xfrm>
             <a:off x="0" y="0"/>
-            <a:ext cx="3050280" cy="560160"/>
+            <a:ext cx="3049920" cy="559800"/>
           </a:xfrm>
           <a:prstGeom prst="rect">
             <a:avLst/>
@@ -12658,7 +12658,7 @@
         <p:spPr>
           <a:xfrm>
             <a:off x="7430400" y="134640"/>
-            <a:ext cx="3696120" cy="512280"/>
+            <a:ext cx="3695760" cy="511920"/>
           </a:xfrm>
           <a:prstGeom prst="rect">
             <a:avLst/>
@@ -12677,7 +12677,7 @@
         <p:spPr>
           <a:xfrm>
             <a:off x="912240" y="1268280"/>
-            <a:ext cx="9206280" cy="359640"/>
+            <a:ext cx="9205920" cy="359280"/>
           </a:xfrm>
           <a:prstGeom prst="rect">
             <a:avLst/>
@@ -12722,7 +12722,7 @@
         <p:spPr>
           <a:xfrm>
             <a:off x="11444760" y="0"/>
-            <a:ext cx="739440" cy="6848280"/>
+            <a:ext cx="739080" cy="6847920"/>
           </a:xfrm>
           <a:prstGeom prst="rect">
             <a:avLst/>
@@ -12771,7 +12771,7 @@
         <p:spPr>
           <a:xfrm>
             <a:off x="0" y="6646680"/>
-            <a:ext cx="12185640" cy="211320"/>
+            <a:ext cx="12185280" cy="211320"/>
           </a:xfrm>
           <a:prstGeom prst="rect">
             <a:avLst/>
@@ -13143,7 +13143,7 @@
         <p:spPr>
           <a:xfrm>
             <a:off x="11444760" y="0"/>
-            <a:ext cx="739440" cy="6848280"/>
+            <a:ext cx="739080" cy="6847920"/>
           </a:xfrm>
           <a:prstGeom prst="rect">
             <a:avLst/>
@@ -13192,7 +13192,7 @@
         <p:spPr>
           <a:xfrm>
             <a:off x="11438640" y="6453360"/>
-            <a:ext cx="756360" cy="363960"/>
+            <a:ext cx="756000" cy="363960"/>
           </a:xfrm>
           <a:prstGeom prst="rect">
             <a:avLst/>
@@ -13218,7 +13218,7 @@
                 <a:spcPct val="100000"/>
               </a:lnSpc>
             </a:pPr>
-            <a:fld id="{FEA11125-1390-4DF0-A7C5-4E930D559860}" type="slidenum">
+            <a:fld id="{6BE6ABE2-2BE4-4D71-B44B-ADC76CD26D6D}" type="slidenum">
               <a:rPr b="0" lang="en-US" sz="1800" spc="-1" strike="noStrike">
                 <a:solidFill>
                   <a:srgbClr val="808080"/>
@@ -13246,7 +13246,7 @@
         <p:spPr>
           <a:xfrm>
             <a:off x="912240" y="1268280"/>
-            <a:ext cx="9206280" cy="359640"/>
+            <a:ext cx="9205920" cy="359280"/>
           </a:xfrm>
           <a:prstGeom prst="rect">
             <a:avLst/>
@@ -13295,7 +13295,7 @@
         <p:spPr>
           <a:xfrm>
             <a:off x="0" y="0"/>
-            <a:ext cx="3050280" cy="560160"/>
+            <a:ext cx="3049920" cy="559800"/>
           </a:xfrm>
           <a:prstGeom prst="rect">
             <a:avLst/>
@@ -13318,7 +13318,7 @@
         <p:spPr>
           <a:xfrm>
             <a:off x="7430400" y="134640"/>
-            <a:ext cx="3696120" cy="512280"/>
+            <a:ext cx="3695760" cy="511920"/>
           </a:xfrm>
           <a:prstGeom prst="rect">
             <a:avLst/>
@@ -13337,7 +13337,7 @@
         <p:spPr>
           <a:xfrm>
             <a:off x="912240" y="1268280"/>
-            <a:ext cx="9206280" cy="359640"/>
+            <a:ext cx="9205920" cy="359280"/>
           </a:xfrm>
           <a:prstGeom prst="rect">
             <a:avLst/>
@@ -13382,7 +13382,7 @@
         <p:spPr>
           <a:xfrm>
             <a:off x="11444760" y="0"/>
-            <a:ext cx="739440" cy="6848280"/>
+            <a:ext cx="739080" cy="6847920"/>
           </a:xfrm>
           <a:prstGeom prst="rect">
             <a:avLst/>
@@ -13431,7 +13431,7 @@
         <p:spPr>
           <a:xfrm>
             <a:off x="0" y="6646680"/>
-            <a:ext cx="12185640" cy="211320"/>
+            <a:ext cx="12185280" cy="211320"/>
           </a:xfrm>
           <a:prstGeom prst="rect">
             <a:avLst/>
@@ -13803,7 +13803,7 @@
         <p:spPr>
           <a:xfrm>
             <a:off x="11444760" y="0"/>
-            <a:ext cx="739440" cy="6848280"/>
+            <a:ext cx="739080" cy="6847920"/>
           </a:xfrm>
           <a:prstGeom prst="rect">
             <a:avLst/>
@@ -13852,7 +13852,7 @@
         <p:spPr>
           <a:xfrm>
             <a:off x="11438640" y="6453360"/>
-            <a:ext cx="756360" cy="363960"/>
+            <a:ext cx="756000" cy="363960"/>
           </a:xfrm>
           <a:prstGeom prst="rect">
             <a:avLst/>
@@ -13878,7 +13878,7 @@
                 <a:spcPct val="100000"/>
               </a:lnSpc>
             </a:pPr>
-            <a:fld id="{F98AD732-64B9-4272-B8B9-B54A9FDA9EDC}" type="slidenum">
+            <a:fld id="{58D3653A-B610-4BB7-9DC4-980766697B76}" type="slidenum">
               <a:rPr b="0" lang="en-US" sz="1800" spc="-1" strike="noStrike">
                 <a:solidFill>
                   <a:srgbClr val="808080"/>
@@ -13906,7 +13906,7 @@
         <p:spPr>
           <a:xfrm>
             <a:off x="912240" y="1268280"/>
-            <a:ext cx="9206280" cy="359640"/>
+            <a:ext cx="9205920" cy="359280"/>
           </a:xfrm>
           <a:prstGeom prst="rect">
             <a:avLst/>
@@ -13955,7 +13955,7 @@
         <p:spPr>
           <a:xfrm>
             <a:off x="0" y="0"/>
-            <a:ext cx="3050280" cy="560160"/>
+            <a:ext cx="3049920" cy="559800"/>
           </a:xfrm>
           <a:prstGeom prst="rect">
             <a:avLst/>
@@ -13978,7 +13978,7 @@
         <p:spPr>
           <a:xfrm>
             <a:off x="7430400" y="134640"/>
-            <a:ext cx="3696120" cy="512280"/>
+            <a:ext cx="3695760" cy="511920"/>
           </a:xfrm>
           <a:prstGeom prst="rect">
             <a:avLst/>
@@ -13997,7 +13997,7 @@
         <p:spPr>
           <a:xfrm>
             <a:off x="11444760" y="1440"/>
-            <a:ext cx="739440" cy="6848280"/>
+            <a:ext cx="739080" cy="6847920"/>
           </a:xfrm>
           <a:prstGeom prst="rect">
             <a:avLst/>
@@ -14046,7 +14046,7 @@
         <p:spPr>
           <a:xfrm>
             <a:off x="11427480" y="6453360"/>
-            <a:ext cx="756360" cy="363960"/>
+            <a:ext cx="756000" cy="363960"/>
           </a:xfrm>
           <a:prstGeom prst="rect">
             <a:avLst/>
@@ -14072,7 +14072,7 @@
                 <a:spcPct val="100000"/>
               </a:lnSpc>
             </a:pPr>
-            <a:fld id="{BBD76339-FDF2-4AF6-9A7C-6DB3B8F3FC74}" type="slidenum">
+            <a:fld id="{9C789723-3424-44A8-B2A6-1669C106A992}" type="slidenum">
               <a:rPr b="0" lang="en-US" sz="1800" spc="-1" strike="noStrike">
                 <a:solidFill>
                   <a:srgbClr val="808080"/>
@@ -14100,7 +14100,7 @@
         <p:spPr>
           <a:xfrm>
             <a:off x="0" y="6646680"/>
-            <a:ext cx="12185640" cy="211320"/>
+            <a:ext cx="12185280" cy="211320"/>
           </a:xfrm>
           <a:prstGeom prst="rect">
             <a:avLst/>
@@ -14472,7 +14472,7 @@
         <p:spPr>
           <a:xfrm>
             <a:off x="11444760" y="0"/>
-            <a:ext cx="739440" cy="6848280"/>
+            <a:ext cx="739080" cy="6847920"/>
           </a:xfrm>
           <a:prstGeom prst="rect">
             <a:avLst/>
@@ -14521,7 +14521,7 @@
         <p:spPr>
           <a:xfrm>
             <a:off x="11438640" y="6453360"/>
-            <a:ext cx="756360" cy="363960"/>
+            <a:ext cx="756000" cy="363960"/>
           </a:xfrm>
           <a:prstGeom prst="rect">
             <a:avLst/>
@@ -14547,7 +14547,7 @@
                 <a:spcPct val="100000"/>
               </a:lnSpc>
             </a:pPr>
-            <a:fld id="{74CE8506-1BAC-4239-A4CE-A1441AC5A805}" type="slidenum">
+            <a:fld id="{DD59C397-2C2A-4688-A606-3FD11FF9699B}" type="slidenum">
               <a:rPr b="0" lang="en-US" sz="1800" spc="-1" strike="noStrike">
                 <a:solidFill>
                   <a:srgbClr val="808080"/>
@@ -14575,7 +14575,7 @@
         <p:spPr>
           <a:xfrm>
             <a:off x="912240" y="1268280"/>
-            <a:ext cx="9206280" cy="359640"/>
+            <a:ext cx="9205920" cy="359280"/>
           </a:xfrm>
           <a:prstGeom prst="rect">
             <a:avLst/>
@@ -14624,7 +14624,7 @@
         <p:spPr>
           <a:xfrm>
             <a:off x="0" y="0"/>
-            <a:ext cx="3050280" cy="560160"/>
+            <a:ext cx="3049920" cy="559800"/>
           </a:xfrm>
           <a:prstGeom prst="rect">
             <a:avLst/>
@@ -14647,7 +14647,7 @@
         <p:spPr>
           <a:xfrm>
             <a:off x="7430400" y="134640"/>
-            <a:ext cx="3696120" cy="512280"/>
+            <a:ext cx="3695760" cy="511920"/>
           </a:xfrm>
           <a:prstGeom prst="rect">
             <a:avLst/>
@@ -14666,7 +14666,7 @@
         <p:spPr>
           <a:xfrm>
             <a:off x="11444760" y="1440"/>
-            <a:ext cx="739440" cy="6848280"/>
+            <a:ext cx="739080" cy="6847920"/>
           </a:xfrm>
           <a:prstGeom prst="rect">
             <a:avLst/>
@@ -14715,7 +14715,7 @@
         <p:spPr>
           <a:xfrm>
             <a:off x="11427480" y="6453360"/>
-            <a:ext cx="756360" cy="363960"/>
+            <a:ext cx="756000" cy="363960"/>
           </a:xfrm>
           <a:prstGeom prst="rect">
             <a:avLst/>
@@ -14741,7 +14741,7 @@
                 <a:spcPct val="100000"/>
               </a:lnSpc>
             </a:pPr>
-            <a:fld id="{17D58596-10A0-4C52-B429-118FD0C9695B}" type="slidenum">
+            <a:fld id="{172B0795-10BD-409A-9D19-36B1E53FF96A}" type="slidenum">
               <a:rPr b="0" lang="en-US" sz="1800" spc="-1" strike="noStrike">
                 <a:solidFill>
                   <a:srgbClr val="808080"/>
@@ -14769,7 +14769,7 @@
         <p:spPr>
           <a:xfrm>
             <a:off x="0" y="6646680"/>
-            <a:ext cx="12185640" cy="211320"/>
+            <a:ext cx="12185280" cy="211320"/>
           </a:xfrm>
           <a:prstGeom prst="rect">
             <a:avLst/>
@@ -14852,70 +14852,7 @@
                 </a:solidFill>
                 <a:latin typeface="Arial"/>
               </a:rPr>
-              <a:t>Clic</a:t>
-            </a:r>
-            <a:r>
-              <a:rPr b="0" lang="en-US" sz="4400" spc="-1" strike="noStrike">
-                <a:solidFill>
-                  <a:srgbClr val="000000"/>
-                </a:solidFill>
-                <a:latin typeface="Arial"/>
-              </a:rPr>
-              <a:t>k to </a:t>
-            </a:r>
-            <a:r>
-              <a:rPr b="0" lang="en-US" sz="4400" spc="-1" strike="noStrike">
-                <a:solidFill>
-                  <a:srgbClr val="000000"/>
-                </a:solidFill>
-                <a:latin typeface="Arial"/>
-              </a:rPr>
-              <a:t>edit </a:t>
-            </a:r>
-            <a:r>
-              <a:rPr b="0" lang="en-US" sz="4400" spc="-1" strike="noStrike">
-                <a:solidFill>
-                  <a:srgbClr val="000000"/>
-                </a:solidFill>
-                <a:latin typeface="Arial"/>
-              </a:rPr>
-              <a:t>the </a:t>
-            </a:r>
-            <a:r>
-              <a:rPr b="0" lang="en-US" sz="4400" spc="-1" strike="noStrike">
-                <a:solidFill>
-                  <a:srgbClr val="000000"/>
-                </a:solidFill>
-                <a:latin typeface="Arial"/>
-              </a:rPr>
-              <a:t>title </a:t>
-            </a:r>
-            <a:r>
-              <a:rPr b="0" lang="en-US" sz="4400" spc="-1" strike="noStrike">
-                <a:solidFill>
-                  <a:srgbClr val="000000"/>
-                </a:solidFill>
-                <a:latin typeface="Arial"/>
-              </a:rPr>
-              <a:t>text </a:t>
-            </a:r>
-            <a:r>
-              <a:rPr b="0" lang="en-US" sz="4400" spc="-1" strike="noStrike">
-                <a:solidFill>
-                  <a:srgbClr val="000000"/>
-                </a:solidFill>
-                <a:latin typeface="Arial"/>
-              </a:rPr>
-              <a:t>for</a:t>
-            </a:r>
-            <a:r>
-              <a:rPr b="0" lang="en-US" sz="4400" spc="-1" strike="noStrike">
-                <a:solidFill>
-                  <a:srgbClr val="000000"/>
-                </a:solidFill>
-                <a:latin typeface="Arial"/>
-              </a:rPr>
-              <a:t>mat</a:t>
+              <a:t>Click to edit the title text format</a:t>
             </a:r>
             <a:endParaRPr b="0" lang="en-US" sz="4400" spc="-1" strike="noStrike">
               <a:solidFill>
@@ -15197,7 +15134,7 @@
         <p:spPr>
           <a:xfrm>
             <a:off x="527400" y="1412640"/>
-            <a:ext cx="10359360" cy="1145880"/>
+            <a:ext cx="10359000" cy="1145520"/>
           </a:xfrm>
           <a:prstGeom prst="rect">
             <a:avLst/>
@@ -15251,7 +15188,7 @@
         <p:spPr>
           <a:xfrm>
             <a:off x="527400" y="2852640"/>
-            <a:ext cx="10359360" cy="2366640"/>
+            <a:ext cx="10359000" cy="2366280"/>
           </a:xfrm>
           <a:prstGeom prst="rect">
             <a:avLst/>
@@ -15456,7 +15393,7 @@
         <p:spPr>
           <a:xfrm>
             <a:off x="542880" y="721800"/>
-            <a:ext cx="10355040" cy="495720"/>
+            <a:ext cx="10354680" cy="495360"/>
           </a:xfrm>
           <a:prstGeom prst="rect">
             <a:avLst/>
@@ -15510,7 +15447,7 @@
         <p:spPr>
           <a:xfrm>
             <a:off x="542880" y="1267200"/>
-            <a:ext cx="10355040" cy="495720"/>
+            <a:ext cx="10354680" cy="495360"/>
           </a:xfrm>
           <a:prstGeom prst="rect">
             <a:avLst/>
@@ -15564,7 +15501,7 @@
         <p:spPr>
           <a:xfrm>
             <a:off x="451800" y="1709280"/>
-            <a:ext cx="8222400" cy="4350600"/>
+            <a:ext cx="8222040" cy="4350240"/>
           </a:xfrm>
           <a:prstGeom prst="rect">
             <a:avLst/>
@@ -15613,7 +15550,7 @@
         <p:spPr>
           <a:xfrm>
             <a:off x="609480" y="1769400"/>
-            <a:ext cx="10585440" cy="4853520"/>
+            <a:ext cx="10585080" cy="4853160"/>
           </a:xfrm>
           <a:prstGeom prst="rect">
             <a:avLst/>
@@ -15764,7 +15701,7 @@
         <p:spPr>
           <a:xfrm>
             <a:off x="542880" y="721800"/>
-            <a:ext cx="10355040" cy="495720"/>
+            <a:ext cx="10354680" cy="495360"/>
           </a:xfrm>
           <a:prstGeom prst="rect">
             <a:avLst/>
@@ -15818,7 +15755,7 @@
         <p:spPr>
           <a:xfrm>
             <a:off x="542880" y="1267200"/>
-            <a:ext cx="10355040" cy="495720"/>
+            <a:ext cx="10354680" cy="495360"/>
           </a:xfrm>
           <a:prstGeom prst="rect">
             <a:avLst/>
@@ -15872,7 +15809,7 @@
         <p:spPr>
           <a:xfrm>
             <a:off x="451800" y="1709280"/>
-            <a:ext cx="8222400" cy="4350600"/>
+            <a:ext cx="8222040" cy="4350240"/>
           </a:xfrm>
           <a:prstGeom prst="rect">
             <a:avLst/>
@@ -15921,7 +15858,7 @@
         <p:spPr>
           <a:xfrm>
             <a:off x="609480" y="1769400"/>
-            <a:ext cx="10585440" cy="4853520"/>
+            <a:ext cx="10585080" cy="4853160"/>
           </a:xfrm>
           <a:prstGeom prst="rect">
             <a:avLst/>
@@ -16200,7 +16137,7 @@
         <p:spPr>
           <a:xfrm>
             <a:off x="542880" y="721800"/>
-            <a:ext cx="10355040" cy="495720"/>
+            <a:ext cx="10354680" cy="495360"/>
           </a:xfrm>
           <a:prstGeom prst="rect">
             <a:avLst/>
@@ -16254,7 +16191,7 @@
         <p:spPr>
           <a:xfrm>
             <a:off x="542880" y="1267200"/>
-            <a:ext cx="10355040" cy="495720"/>
+            <a:ext cx="10354680" cy="495360"/>
           </a:xfrm>
           <a:prstGeom prst="rect">
             <a:avLst/>
@@ -16308,7 +16245,7 @@
         <p:spPr>
           <a:xfrm>
             <a:off x="451800" y="1709280"/>
-            <a:ext cx="8222400" cy="4350600"/>
+            <a:ext cx="8222040" cy="4350240"/>
           </a:xfrm>
           <a:prstGeom prst="rect">
             <a:avLst/>
@@ -16357,7 +16294,7 @@
         <p:spPr>
           <a:xfrm>
             <a:off x="609480" y="1769400"/>
-            <a:ext cx="10585440" cy="4853520"/>
+            <a:ext cx="10585080" cy="4853160"/>
           </a:xfrm>
           <a:prstGeom prst="rect">
             <a:avLst/>
@@ -16668,7 +16605,7 @@
         <p:spPr>
           <a:xfrm>
             <a:off x="542880" y="721800"/>
-            <a:ext cx="10355040" cy="495720"/>
+            <a:ext cx="10354680" cy="495360"/>
           </a:xfrm>
           <a:prstGeom prst="rect">
             <a:avLst/>
@@ -16722,7 +16659,7 @@
         <p:spPr>
           <a:xfrm>
             <a:off x="542880" y="1267200"/>
-            <a:ext cx="10355040" cy="495720"/>
+            <a:ext cx="10354680" cy="495360"/>
           </a:xfrm>
           <a:prstGeom prst="rect">
             <a:avLst/>
@@ -16776,7 +16713,7 @@
         <p:spPr>
           <a:xfrm>
             <a:off x="451800" y="1709280"/>
-            <a:ext cx="8222400" cy="4350600"/>
+            <a:ext cx="8222040" cy="4350240"/>
           </a:xfrm>
           <a:prstGeom prst="rect">
             <a:avLst/>
@@ -16825,7 +16762,7 @@
         <p:spPr>
           <a:xfrm>
             <a:off x="609480" y="1769400"/>
-            <a:ext cx="10585440" cy="4853520"/>
+            <a:ext cx="10585080" cy="4853160"/>
           </a:xfrm>
           <a:prstGeom prst="rect">
             <a:avLst/>
@@ -17136,7 +17073,7 @@
         <p:spPr>
           <a:xfrm>
             <a:off x="542880" y="721800"/>
-            <a:ext cx="10355040" cy="495720"/>
+            <a:ext cx="10354680" cy="495360"/>
           </a:xfrm>
           <a:prstGeom prst="rect">
             <a:avLst/>
@@ -17190,7 +17127,7 @@
         <p:spPr>
           <a:xfrm>
             <a:off x="542880" y="1267200"/>
-            <a:ext cx="10355040" cy="495720"/>
+            <a:ext cx="10354680" cy="495360"/>
           </a:xfrm>
           <a:prstGeom prst="rect">
             <a:avLst/>
@@ -17244,7 +17181,7 @@
         <p:spPr>
           <a:xfrm>
             <a:off x="451800" y="1709280"/>
-            <a:ext cx="8222400" cy="4350600"/>
+            <a:ext cx="8222040" cy="4350240"/>
           </a:xfrm>
           <a:prstGeom prst="rect">
             <a:avLst/>
@@ -17293,7 +17230,7 @@
         <p:spPr>
           <a:xfrm>
             <a:off x="609480" y="1769400"/>
-            <a:ext cx="10585440" cy="4853520"/>
+            <a:ext cx="10585080" cy="4853160"/>
           </a:xfrm>
           <a:prstGeom prst="rect">
             <a:avLst/>
@@ -17636,7 +17573,7 @@
         <p:spPr>
           <a:xfrm>
             <a:off x="542880" y="721800"/>
-            <a:ext cx="10355040" cy="495720"/>
+            <a:ext cx="10354680" cy="495360"/>
           </a:xfrm>
           <a:prstGeom prst="rect">
             <a:avLst/>
@@ -17690,7 +17627,7 @@
         <p:spPr>
           <a:xfrm>
             <a:off x="542880" y="1267200"/>
-            <a:ext cx="10355040" cy="495720"/>
+            <a:ext cx="10354680" cy="495360"/>
           </a:xfrm>
           <a:prstGeom prst="rect">
             <a:avLst/>
@@ -17744,7 +17681,7 @@
         <p:spPr>
           <a:xfrm>
             <a:off x="451800" y="1709280"/>
-            <a:ext cx="8222400" cy="4350600"/>
+            <a:ext cx="8222040" cy="4350240"/>
           </a:xfrm>
           <a:prstGeom prst="rect">
             <a:avLst/>
@@ -17793,7 +17730,7 @@
         <p:spPr>
           <a:xfrm>
             <a:off x="609480" y="1769400"/>
-            <a:ext cx="10585440" cy="4853520"/>
+            <a:ext cx="10585080" cy="4853160"/>
           </a:xfrm>
           <a:prstGeom prst="rect">
             <a:avLst/>
@@ -18072,7 +18009,7 @@
         <p:spPr>
           <a:xfrm>
             <a:off x="335520" y="4406760"/>
-            <a:ext cx="10746720" cy="1355760"/>
+            <a:ext cx="10746360" cy="1355400"/>
           </a:xfrm>
           <a:prstGeom prst="rect">
             <a:avLst/>
@@ -18126,7 +18063,7 @@
         <p:spPr>
           <a:xfrm>
             <a:off x="335520" y="2906640"/>
-            <a:ext cx="10746720" cy="1493640"/>
+            <a:ext cx="10746360" cy="1493280"/>
           </a:xfrm>
           <a:prstGeom prst="rect">
             <a:avLst/>
@@ -18201,7 +18138,7 @@
         <p:spPr>
           <a:xfrm>
             <a:off x="542880" y="721800"/>
-            <a:ext cx="10355040" cy="495720"/>
+            <a:ext cx="10354680" cy="495360"/>
           </a:xfrm>
           <a:prstGeom prst="rect">
             <a:avLst/>
@@ -18255,7 +18192,7 @@
         <p:spPr>
           <a:xfrm>
             <a:off x="542880" y="1267200"/>
-            <a:ext cx="10355040" cy="495720"/>
+            <a:ext cx="10354680" cy="495360"/>
           </a:xfrm>
           <a:prstGeom prst="rect">
             <a:avLst/>
@@ -18309,7 +18246,7 @@
         <p:spPr>
           <a:xfrm>
             <a:off x="451800" y="1709280"/>
-            <a:ext cx="8222400" cy="4350600"/>
+            <a:ext cx="8222040" cy="4350240"/>
           </a:xfrm>
           <a:prstGeom prst="rect">
             <a:avLst/>
@@ -18358,7 +18295,7 @@
         <p:spPr>
           <a:xfrm>
             <a:off x="609480" y="1769400"/>
-            <a:ext cx="10585440" cy="4853520"/>
+            <a:ext cx="10585080" cy="4853160"/>
           </a:xfrm>
           <a:prstGeom prst="rect">
             <a:avLst/>
@@ -18445,7 +18382,7 @@
         <p:spPr>
           <a:xfrm>
             <a:off x="542880" y="721800"/>
-            <a:ext cx="10355040" cy="495720"/>
+            <a:ext cx="10354680" cy="495360"/>
           </a:xfrm>
           <a:prstGeom prst="rect">
             <a:avLst/>
@@ -18499,7 +18436,7 @@
         <p:spPr>
           <a:xfrm>
             <a:off x="542880" y="1267200"/>
-            <a:ext cx="10355040" cy="495720"/>
+            <a:ext cx="10354680" cy="495360"/>
           </a:xfrm>
           <a:prstGeom prst="rect">
             <a:avLst/>
@@ -18553,7 +18490,7 @@
         <p:spPr>
           <a:xfrm>
             <a:off x="451800" y="1709280"/>
-            <a:ext cx="8222400" cy="4350600"/>
+            <a:ext cx="8222040" cy="4350240"/>
           </a:xfrm>
           <a:prstGeom prst="rect">
             <a:avLst/>
@@ -18602,7 +18539,7 @@
         <p:spPr>
           <a:xfrm>
             <a:off x="609480" y="1769400"/>
-            <a:ext cx="10585440" cy="4853520"/>
+            <a:ext cx="10585080" cy="4853160"/>
           </a:xfrm>
           <a:prstGeom prst="rect">
             <a:avLst/>
@@ -18617,7 +18554,7 @@
             <a:normAutofit fontScale="98000"/>
           </a:bodyPr>
           <a:p>
-            <a:pPr marL="106920" indent="0">
+            <a:pPr marL="106560" indent="0">
               <a:lnSpc>
                 <a:spcPct val="100000"/>
               </a:lnSpc>
@@ -19038,7 +18975,7 @@
         <p:spPr>
           <a:xfrm>
             <a:off x="542880" y="721800"/>
-            <a:ext cx="10355040" cy="495720"/>
+            <a:ext cx="10354680" cy="495360"/>
           </a:xfrm>
           <a:prstGeom prst="rect">
             <a:avLst/>
@@ -19092,7 +19029,7 @@
         <p:spPr>
           <a:xfrm>
             <a:off x="542880" y="1267200"/>
-            <a:ext cx="10355040" cy="495720"/>
+            <a:ext cx="10354680" cy="495360"/>
           </a:xfrm>
           <a:prstGeom prst="rect">
             <a:avLst/>
@@ -19146,7 +19083,7 @@
         <p:spPr>
           <a:xfrm>
             <a:off x="451800" y="1709280"/>
-            <a:ext cx="8222400" cy="4350600"/>
+            <a:ext cx="8222040" cy="4350240"/>
           </a:xfrm>
           <a:prstGeom prst="rect">
             <a:avLst/>
@@ -19195,7 +19132,7 @@
         <p:spPr>
           <a:xfrm>
             <a:off x="609480" y="1766160"/>
-            <a:ext cx="10585440" cy="4853520"/>
+            <a:ext cx="10585080" cy="4853160"/>
           </a:xfrm>
           <a:prstGeom prst="rect">
             <a:avLst/>
@@ -19547,7 +19484,7 @@
         <p:spPr>
           <a:xfrm>
             <a:off x="539640" y="764640"/>
-            <a:ext cx="10740600" cy="491400"/>
+            <a:ext cx="10740240" cy="491040"/>
           </a:xfrm>
           <a:prstGeom prst="rect">
             <a:avLst/>
@@ -19601,7 +19538,7 @@
         <p:spPr>
           <a:xfrm>
             <a:off x="539640" y="1268640"/>
-            <a:ext cx="10740600" cy="5028120"/>
+            <a:ext cx="10740240" cy="5027760"/>
           </a:xfrm>
           <a:prstGeom prst="rect">
             <a:avLst/>
@@ -20110,7 +20047,7 @@
         <p:spPr>
           <a:xfrm>
             <a:off x="542880" y="721800"/>
-            <a:ext cx="10355040" cy="495720"/>
+            <a:ext cx="10354680" cy="495360"/>
           </a:xfrm>
           <a:prstGeom prst="rect">
             <a:avLst/>
@@ -20164,7 +20101,7 @@
         <p:spPr>
           <a:xfrm>
             <a:off x="542880" y="1267200"/>
-            <a:ext cx="10355040" cy="495720"/>
+            <a:ext cx="10354680" cy="495360"/>
           </a:xfrm>
           <a:prstGeom prst="rect">
             <a:avLst/>
@@ -20218,7 +20155,7 @@
         <p:spPr>
           <a:xfrm>
             <a:off x="451800" y="1709280"/>
-            <a:ext cx="8222400" cy="4350600"/>
+            <a:ext cx="8222040" cy="4350240"/>
           </a:xfrm>
           <a:prstGeom prst="rect">
             <a:avLst/>
@@ -20267,7 +20204,7 @@
         <p:spPr>
           <a:xfrm>
             <a:off x="609480" y="1769400"/>
-            <a:ext cx="10585440" cy="4853520"/>
+            <a:ext cx="10585080" cy="4853160"/>
           </a:xfrm>
           <a:prstGeom prst="rect">
             <a:avLst/>
@@ -20689,7 +20626,7 @@
         <p:spPr>
           <a:xfrm>
             <a:off x="542880" y="721800"/>
-            <a:ext cx="10355040" cy="495720"/>
+            <a:ext cx="10354680" cy="495360"/>
           </a:xfrm>
           <a:prstGeom prst="rect">
             <a:avLst/>
@@ -20743,7 +20680,7 @@
         <p:spPr>
           <a:xfrm>
             <a:off x="542880" y="1267200"/>
-            <a:ext cx="10355040" cy="495720"/>
+            <a:ext cx="10354680" cy="495360"/>
           </a:xfrm>
           <a:prstGeom prst="rect">
             <a:avLst/>
@@ -20797,7 +20734,7 @@
         <p:spPr>
           <a:xfrm>
             <a:off x="451800" y="1709280"/>
-            <a:ext cx="8222400" cy="4350600"/>
+            <a:ext cx="8222040" cy="4350240"/>
           </a:xfrm>
           <a:prstGeom prst="rect">
             <a:avLst/>
@@ -20846,7 +20783,7 @@
         <p:spPr>
           <a:xfrm>
             <a:off x="609480" y="1769400"/>
-            <a:ext cx="10585440" cy="4853520"/>
+            <a:ext cx="10585080" cy="4853160"/>
           </a:xfrm>
           <a:prstGeom prst="rect">
             <a:avLst/>
@@ -21212,7 +21149,7 @@
         <p:spPr>
           <a:xfrm>
             <a:off x="335520" y="4406760"/>
-            <a:ext cx="10746720" cy="1355760"/>
+            <a:ext cx="10746360" cy="1355400"/>
           </a:xfrm>
           <a:prstGeom prst="rect">
             <a:avLst/>
@@ -21266,7 +21203,7 @@
         <p:spPr>
           <a:xfrm>
             <a:off x="335520" y="2906640"/>
-            <a:ext cx="10746720" cy="1493640"/>
+            <a:ext cx="10746360" cy="1493280"/>
           </a:xfrm>
           <a:prstGeom prst="rect">
             <a:avLst/>
@@ -21341,7 +21278,7 @@
         <p:spPr>
           <a:xfrm>
             <a:off x="542880" y="721800"/>
-            <a:ext cx="10355040" cy="495720"/>
+            <a:ext cx="10354680" cy="495360"/>
           </a:xfrm>
           <a:prstGeom prst="rect">
             <a:avLst/>
@@ -21395,7 +21332,7 @@
         <p:spPr>
           <a:xfrm>
             <a:off x="542880" y="1267200"/>
-            <a:ext cx="10355040" cy="495720"/>
+            <a:ext cx="10354680" cy="495360"/>
           </a:xfrm>
           <a:prstGeom prst="rect">
             <a:avLst/>
@@ -21449,7 +21386,7 @@
         <p:spPr>
           <a:xfrm>
             <a:off x="451800" y="1709280"/>
-            <a:ext cx="8222400" cy="4350600"/>
+            <a:ext cx="8222040" cy="4350240"/>
           </a:xfrm>
           <a:prstGeom prst="rect">
             <a:avLst/>
@@ -21498,7 +21435,7 @@
         <p:spPr>
           <a:xfrm>
             <a:off x="609480" y="1769400"/>
-            <a:ext cx="10585440" cy="4853520"/>
+            <a:ext cx="10585080" cy="4853160"/>
           </a:xfrm>
           <a:prstGeom prst="rect">
             <a:avLst/>
@@ -21885,7 +21822,7 @@
         <p:spPr>
           <a:xfrm>
             <a:off x="542880" y="721800"/>
-            <a:ext cx="10355040" cy="495720"/>
+            <a:ext cx="10354680" cy="495360"/>
           </a:xfrm>
           <a:prstGeom prst="rect">
             <a:avLst/>
@@ -21939,7 +21876,7 @@
         <p:spPr>
           <a:xfrm>
             <a:off x="542880" y="1267200"/>
-            <a:ext cx="10355040" cy="495720"/>
+            <a:ext cx="10354680" cy="495360"/>
           </a:xfrm>
           <a:prstGeom prst="rect">
             <a:avLst/>
@@ -21993,7 +21930,7 @@
         <p:spPr>
           <a:xfrm>
             <a:off x="451800" y="1709280"/>
-            <a:ext cx="8222400" cy="4350600"/>
+            <a:ext cx="8222040" cy="4350240"/>
           </a:xfrm>
           <a:prstGeom prst="rect">
             <a:avLst/>
@@ -22042,7 +21979,7 @@
         <p:spPr>
           <a:xfrm>
             <a:off x="609480" y="1769400"/>
-            <a:ext cx="10585440" cy="4853520"/>
+            <a:ext cx="10585080" cy="4853160"/>
           </a:xfrm>
           <a:prstGeom prst="rect">
             <a:avLst/>
@@ -22289,7 +22226,7 @@
         <p:spPr>
           <a:xfrm>
             <a:off x="542880" y="721800"/>
-            <a:ext cx="10355040" cy="495720"/>
+            <a:ext cx="10354680" cy="495360"/>
           </a:xfrm>
           <a:prstGeom prst="rect">
             <a:avLst/>
@@ -22343,7 +22280,7 @@
         <p:spPr>
           <a:xfrm>
             <a:off x="542880" y="1267200"/>
-            <a:ext cx="10355040" cy="495720"/>
+            <a:ext cx="10354680" cy="495360"/>
           </a:xfrm>
           <a:prstGeom prst="rect">
             <a:avLst/>
@@ -22397,7 +22334,7 @@
         <p:spPr>
           <a:xfrm>
             <a:off x="451800" y="1709280"/>
-            <a:ext cx="8222400" cy="4350600"/>
+            <a:ext cx="8222040" cy="4350240"/>
           </a:xfrm>
           <a:prstGeom prst="rect">
             <a:avLst/>
@@ -22446,7 +22383,7 @@
         <p:spPr>
           <a:xfrm>
             <a:off x="609480" y="2057400"/>
-            <a:ext cx="5330880" cy="4565520"/>
+            <a:ext cx="5330520" cy="4565160"/>
           </a:xfrm>
           <a:prstGeom prst="rect">
             <a:avLst/>
@@ -22714,7 +22651,7 @@
         <p:spPr>
           <a:xfrm>
             <a:off x="5973840" y="1769760"/>
-            <a:ext cx="5330880" cy="4853520"/>
+            <a:ext cx="5330520" cy="4853160"/>
           </a:xfrm>
           <a:prstGeom prst="rect">
             <a:avLst/>
@@ -22985,7 +22922,7 @@
         <p:spPr>
           <a:xfrm>
             <a:off x="542880" y="721800"/>
-            <a:ext cx="10355040" cy="495720"/>
+            <a:ext cx="10354680" cy="495360"/>
           </a:xfrm>
           <a:prstGeom prst="rect">
             <a:avLst/>
@@ -23039,7 +22976,7 @@
         <p:spPr>
           <a:xfrm>
             <a:off x="542880" y="1267200"/>
-            <a:ext cx="10355040" cy="495720"/>
+            <a:ext cx="10354680" cy="495360"/>
           </a:xfrm>
           <a:prstGeom prst="rect">
             <a:avLst/>
@@ -23093,7 +23030,7 @@
         <p:spPr>
           <a:xfrm>
             <a:off x="451800" y="1709280"/>
-            <a:ext cx="8222400" cy="4350600"/>
+            <a:ext cx="8222040" cy="4350240"/>
           </a:xfrm>
           <a:prstGeom prst="rect">
             <a:avLst/>
@@ -23142,7 +23079,7 @@
         <p:spPr>
           <a:xfrm>
             <a:off x="609480" y="1769400"/>
-            <a:ext cx="10361160" cy="4853520"/>
+            <a:ext cx="10360800" cy="4853160"/>
           </a:xfrm>
           <a:prstGeom prst="rect">
             <a:avLst/>
@@ -23647,7 +23584,7 @@
         <p:spPr>
           <a:xfrm>
             <a:off x="542880" y="721800"/>
-            <a:ext cx="10355040" cy="495720"/>
+            <a:ext cx="10354680" cy="495360"/>
           </a:xfrm>
           <a:prstGeom prst="rect">
             <a:avLst/>
@@ -23701,7 +23638,7 @@
         <p:spPr>
           <a:xfrm>
             <a:off x="542880" y="1267200"/>
-            <a:ext cx="10355040" cy="495720"/>
+            <a:ext cx="10354680" cy="495360"/>
           </a:xfrm>
           <a:prstGeom prst="rect">
             <a:avLst/>
@@ -23755,7 +23692,7 @@
         <p:spPr>
           <a:xfrm>
             <a:off x="451800" y="1709280"/>
-            <a:ext cx="8222400" cy="4350600"/>
+            <a:ext cx="8222040" cy="4350240"/>
           </a:xfrm>
           <a:prstGeom prst="rect">
             <a:avLst/>
@@ -23804,7 +23741,7 @@
         <p:spPr>
           <a:xfrm>
             <a:off x="609480" y="1769400"/>
-            <a:ext cx="10585440" cy="4853520"/>
+            <a:ext cx="10585080" cy="4853160"/>
           </a:xfrm>
           <a:prstGeom prst="rect">
             <a:avLst/>
@@ -24051,7 +23988,7 @@
         <p:spPr>
           <a:xfrm>
             <a:off x="542880" y="721800"/>
-            <a:ext cx="10355040" cy="495720"/>
+            <a:ext cx="10354680" cy="495360"/>
           </a:xfrm>
           <a:prstGeom prst="rect">
             <a:avLst/>
@@ -24105,7 +24042,7 @@
         <p:spPr>
           <a:xfrm>
             <a:off x="542880" y="1267200"/>
-            <a:ext cx="10355040" cy="495720"/>
+            <a:ext cx="10354680" cy="495360"/>
           </a:xfrm>
           <a:prstGeom prst="rect">
             <a:avLst/>
@@ -24159,7 +24096,7 @@
         <p:spPr>
           <a:xfrm>
             <a:off x="451800" y="1709280"/>
-            <a:ext cx="8222400" cy="4350600"/>
+            <a:ext cx="8222040" cy="4350240"/>
           </a:xfrm>
           <a:prstGeom prst="rect">
             <a:avLst/>
@@ -24208,7 +24145,7 @@
         <p:spPr>
           <a:xfrm>
             <a:off x="609480" y="1769400"/>
-            <a:ext cx="10585440" cy="4853520"/>
+            <a:ext cx="10585080" cy="4853160"/>
           </a:xfrm>
           <a:prstGeom prst="rect">
             <a:avLst/>
@@ -24497,7 +24434,7 @@
         <p:spPr>
           <a:xfrm>
             <a:off x="542880" y="721800"/>
-            <a:ext cx="10355040" cy="495720"/>
+            <a:ext cx="10354680" cy="495360"/>
           </a:xfrm>
           <a:prstGeom prst="rect">
             <a:avLst/>
@@ -24551,7 +24488,7 @@
         <p:spPr>
           <a:xfrm>
             <a:off x="542880" y="1267200"/>
-            <a:ext cx="10355040" cy="495720"/>
+            <a:ext cx="10354680" cy="495360"/>
           </a:xfrm>
           <a:prstGeom prst="rect">
             <a:avLst/>
@@ -24605,7 +24542,7 @@
         <p:spPr>
           <a:xfrm>
             <a:off x="451800" y="1709280"/>
-            <a:ext cx="8222400" cy="4350600"/>
+            <a:ext cx="8222040" cy="4350240"/>
           </a:xfrm>
           <a:prstGeom prst="rect">
             <a:avLst/>
@@ -24654,7 +24591,7 @@
         <p:spPr>
           <a:xfrm>
             <a:off x="609480" y="1769400"/>
-            <a:ext cx="10585440" cy="4853520"/>
+            <a:ext cx="10585080" cy="4853160"/>
           </a:xfrm>
           <a:prstGeom prst="rect">
             <a:avLst/>
@@ -24901,7 +24838,7 @@
         <p:spPr>
           <a:xfrm>
             <a:off x="539640" y="764640"/>
-            <a:ext cx="10747440" cy="498240"/>
+            <a:ext cx="10747080" cy="497880"/>
           </a:xfrm>
           <a:prstGeom prst="rect">
             <a:avLst/>
@@ -24955,7 +24892,7 @@
         <p:spPr>
           <a:xfrm>
             <a:off x="539640" y="1268640"/>
-            <a:ext cx="10747440" cy="5034960"/>
+            <a:ext cx="10747080" cy="5034600"/>
           </a:xfrm>
           <a:prstGeom prst="rect">
             <a:avLst/>
@@ -25304,7 +25241,7 @@
         <p:spPr>
           <a:xfrm>
             <a:off x="542880" y="721800"/>
-            <a:ext cx="10355040" cy="495720"/>
+            <a:ext cx="10354680" cy="495360"/>
           </a:xfrm>
           <a:prstGeom prst="rect">
             <a:avLst/>
@@ -25358,7 +25295,7 @@
         <p:spPr>
           <a:xfrm>
             <a:off x="542880" y="1267200"/>
-            <a:ext cx="10355040" cy="495720"/>
+            <a:ext cx="10354680" cy="495360"/>
           </a:xfrm>
           <a:prstGeom prst="rect">
             <a:avLst/>
@@ -25412,7 +25349,7 @@
         <p:spPr>
           <a:xfrm>
             <a:off x="451800" y="1709280"/>
-            <a:ext cx="8222400" cy="4350600"/>
+            <a:ext cx="8222040" cy="4350240"/>
           </a:xfrm>
           <a:prstGeom prst="rect">
             <a:avLst/>
@@ -25461,7 +25398,7 @@
         <p:spPr>
           <a:xfrm>
             <a:off x="609480" y="1769400"/>
-            <a:ext cx="10585440" cy="4853520"/>
+            <a:ext cx="10585080" cy="4853160"/>
           </a:xfrm>
           <a:prstGeom prst="rect">
             <a:avLst/>
@@ -25772,7 +25709,7 @@
         <p:spPr>
           <a:xfrm>
             <a:off x="542880" y="721800"/>
-            <a:ext cx="10355040" cy="495720"/>
+            <a:ext cx="10354680" cy="495360"/>
           </a:xfrm>
           <a:prstGeom prst="rect">
             <a:avLst/>
@@ -25826,7 +25763,7 @@
         <p:spPr>
           <a:xfrm>
             <a:off x="542880" y="1267200"/>
-            <a:ext cx="10355040" cy="495720"/>
+            <a:ext cx="10354680" cy="495360"/>
           </a:xfrm>
           <a:prstGeom prst="rect">
             <a:avLst/>
@@ -25880,7 +25817,7 @@
         <p:spPr>
           <a:xfrm>
             <a:off x="451800" y="1709280"/>
-            <a:ext cx="8222400" cy="4350600"/>
+            <a:ext cx="8222040" cy="4350240"/>
           </a:xfrm>
           <a:prstGeom prst="rect">
             <a:avLst/>
@@ -25929,7 +25866,7 @@
         <p:spPr>
           <a:xfrm>
             <a:off x="609480" y="1769400"/>
-            <a:ext cx="10585440" cy="4853520"/>
+            <a:ext cx="10585080" cy="4853160"/>
           </a:xfrm>
           <a:prstGeom prst="rect">
             <a:avLst/>
@@ -26272,7 +26209,7 @@
         <p:spPr>
           <a:xfrm>
             <a:off x="542880" y="721800"/>
-            <a:ext cx="10355040" cy="495720"/>
+            <a:ext cx="10354680" cy="495360"/>
           </a:xfrm>
           <a:prstGeom prst="rect">
             <a:avLst/>
@@ -26326,7 +26263,7 @@
         <p:spPr>
           <a:xfrm>
             <a:off x="542880" y="1267200"/>
-            <a:ext cx="10355040" cy="495720"/>
+            <a:ext cx="10354680" cy="495360"/>
           </a:xfrm>
           <a:prstGeom prst="rect">
             <a:avLst/>
@@ -26380,7 +26317,7 @@
         <p:spPr>
           <a:xfrm>
             <a:off x="451800" y="1709280"/>
-            <a:ext cx="8222400" cy="4350600"/>
+            <a:ext cx="8222040" cy="4350240"/>
           </a:xfrm>
           <a:prstGeom prst="rect">
             <a:avLst/>
@@ -26429,7 +26366,7 @@
         <p:spPr>
           <a:xfrm>
             <a:off x="609480" y="1769400"/>
-            <a:ext cx="10585440" cy="4853520"/>
+            <a:ext cx="10585080" cy="4853160"/>
           </a:xfrm>
           <a:prstGeom prst="rect">
             <a:avLst/>
@@ -26676,7 +26613,7 @@
         <p:spPr>
           <a:xfrm>
             <a:off x="542880" y="721800"/>
-            <a:ext cx="10355040" cy="495720"/>
+            <a:ext cx="10354680" cy="495360"/>
           </a:xfrm>
           <a:prstGeom prst="rect">
             <a:avLst/>
@@ -26730,7 +26667,7 @@
         <p:spPr>
           <a:xfrm>
             <a:off x="542880" y="1267200"/>
-            <a:ext cx="10355040" cy="495720"/>
+            <a:ext cx="10354680" cy="495360"/>
           </a:xfrm>
           <a:prstGeom prst="rect">
             <a:avLst/>
@@ -26784,7 +26721,7 @@
         <p:spPr>
           <a:xfrm>
             <a:off x="451800" y="1709280"/>
-            <a:ext cx="8222400" cy="4350600"/>
+            <a:ext cx="8222040" cy="4350240"/>
           </a:xfrm>
           <a:prstGeom prst="rect">
             <a:avLst/>
@@ -26833,7 +26770,7 @@
         <p:spPr>
           <a:xfrm>
             <a:off x="609480" y="1769400"/>
-            <a:ext cx="10585440" cy="4853520"/>
+            <a:ext cx="10585080" cy="4853160"/>
           </a:xfrm>
           <a:prstGeom prst="rect">
             <a:avLst/>
@@ -26966,7 +26903,7 @@
                 <a:latin typeface="DejaVu Sans"/>
                 <a:ea typeface="DejaVu Sans"/>
               </a:rPr>
-              <a:t>Criteria for good requirements (Lecture 04, Part 1, Section 2)</a:t>
+              <a:t>Criteria for good requirements (Lecture 06, Part 2, Section 1)</a:t>
             </a:r>
             <a:endParaRPr b="0" lang="en-US" sz="1800" spc="-1" strike="noStrike">
               <a:solidFill>
@@ -26998,7 +26935,7 @@
                 <a:latin typeface="DejaVu Sans"/>
                 <a:ea typeface="DejaVu Sans"/>
               </a:rPr>
-              <a:t>Characteristics for good requirements documents (Lecture 04, Part 1, Section 3)</a:t>
+              <a:t>Characteristics for good requirements documents (Lecture 06, Part 3, Section 1)</a:t>
             </a:r>
             <a:endParaRPr b="0" lang="en-US" sz="1800" spc="-1" strike="noStrike">
               <a:solidFill>
@@ -27112,7 +27049,7 @@
         <p:spPr>
           <a:xfrm>
             <a:off x="542880" y="721800"/>
-            <a:ext cx="10355040" cy="495720"/>
+            <a:ext cx="10354680" cy="495360"/>
           </a:xfrm>
           <a:prstGeom prst="rect">
             <a:avLst/>
@@ -27166,7 +27103,7 @@
         <p:spPr>
           <a:xfrm>
             <a:off x="542880" y="1267200"/>
-            <a:ext cx="10355040" cy="495720"/>
+            <a:ext cx="10354680" cy="495360"/>
           </a:xfrm>
           <a:prstGeom prst="rect">
             <a:avLst/>
@@ -27220,7 +27157,7 @@
         <p:spPr>
           <a:xfrm>
             <a:off x="451800" y="1709280"/>
-            <a:ext cx="8222400" cy="4350600"/>
+            <a:ext cx="8222040" cy="4350240"/>
           </a:xfrm>
           <a:prstGeom prst="rect">
             <a:avLst/>
@@ -27269,7 +27206,7 @@
         <p:spPr>
           <a:xfrm>
             <a:off x="609480" y="1769400"/>
-            <a:ext cx="10585440" cy="4853520"/>
+            <a:ext cx="10585080" cy="4853160"/>
           </a:xfrm>
           <a:prstGeom prst="rect">
             <a:avLst/>
@@ -27608,7 +27545,7 @@
         <p:spPr>
           <a:xfrm>
             <a:off x="542880" y="721800"/>
-            <a:ext cx="10355040" cy="495720"/>
+            <a:ext cx="10354680" cy="495360"/>
           </a:xfrm>
           <a:prstGeom prst="rect">
             <a:avLst/>
@@ -27662,7 +27599,7 @@
         <p:spPr>
           <a:xfrm>
             <a:off x="542880" y="1267200"/>
-            <a:ext cx="10355040" cy="495720"/>
+            <a:ext cx="10354680" cy="495360"/>
           </a:xfrm>
           <a:prstGeom prst="rect">
             <a:avLst/>
@@ -27716,7 +27653,7 @@
         <p:spPr>
           <a:xfrm>
             <a:off x="451800" y="1709280"/>
-            <a:ext cx="8222400" cy="4350600"/>
+            <a:ext cx="8222040" cy="4350240"/>
           </a:xfrm>
           <a:prstGeom prst="rect">
             <a:avLst/>
@@ -27765,7 +27702,7 @@
         <p:spPr>
           <a:xfrm>
             <a:off x="609480" y="1769400"/>
-            <a:ext cx="10585440" cy="4853520"/>
+            <a:ext cx="10585080" cy="4853160"/>
           </a:xfrm>
           <a:prstGeom prst="rect">
             <a:avLst/>
@@ -28109,7 +28046,7 @@
         <p:spPr>
           <a:xfrm>
             <a:off x="542880" y="721800"/>
-            <a:ext cx="10355040" cy="495720"/>
+            <a:ext cx="10354680" cy="495360"/>
           </a:xfrm>
           <a:prstGeom prst="rect">
             <a:avLst/>
@@ -28163,7 +28100,7 @@
         <p:spPr>
           <a:xfrm>
             <a:off x="542880" y="1267200"/>
-            <a:ext cx="10355040" cy="495720"/>
+            <a:ext cx="10354680" cy="495360"/>
           </a:xfrm>
           <a:prstGeom prst="rect">
             <a:avLst/>
@@ -28217,7 +28154,7 @@
         <p:spPr>
           <a:xfrm>
             <a:off x="451800" y="1709280"/>
-            <a:ext cx="8222400" cy="4350600"/>
+            <a:ext cx="8222040" cy="4350240"/>
           </a:xfrm>
           <a:prstGeom prst="rect">
             <a:avLst/>
@@ -28266,7 +28203,7 @@
         <p:spPr>
           <a:xfrm>
             <a:off x="609480" y="1769400"/>
-            <a:ext cx="10585440" cy="4853520"/>
+            <a:ext cx="10585080" cy="4853160"/>
           </a:xfrm>
           <a:prstGeom prst="rect">
             <a:avLst/>
@@ -28280,33 +28217,6 @@
           <a:bodyPr lIns="0" rIns="0" tIns="0" bIns="0" anchor="ctr">
             <a:normAutofit/>
           </a:bodyPr>
-          <a:p>
-            <a:pPr marL="216000" indent="0">
-              <a:lnSpc>
-                <a:spcPct val="100000"/>
-              </a:lnSpc>
-              <a:spcBef>
-                <a:spcPts val="1417"/>
-              </a:spcBef>
-              <a:buNone/>
-            </a:pPr>
-            <a:r>
-              <a:rPr b="0" lang="en-US" sz="2000" spc="-1" strike="noStrike">
-                <a:solidFill>
-                  <a:srgbClr val="000000"/>
-                </a:solidFill>
-                <a:latin typeface="DejaVu Sans"/>
-                <a:ea typeface="DejaVu Sans"/>
-              </a:rPr>
-              <a:t>Without reviews</a:t>
-            </a:r>
-            <a:endParaRPr b="0" lang="en-US" sz="2000" spc="-1" strike="noStrike">
-              <a:solidFill>
-                <a:srgbClr val="000000"/>
-              </a:solidFill>
-              <a:latin typeface="Arial"/>
-            </a:endParaRPr>
-          </a:p>
           <a:p>
             <a:pPr marL="216000" indent="0">
               <a:lnSpc>
@@ -28320,6 +28230,16 @@
                 <a:tab algn="l" pos="0"/>
               </a:tabLst>
             </a:pPr>
+            <a:r>
+              <a:rPr b="0" lang="en-US" sz="2000" spc="-1" strike="noStrike">
+                <a:solidFill>
+                  <a:srgbClr val="000000"/>
+                </a:solidFill>
+                <a:latin typeface="DejaVu Sans"/>
+                <a:ea typeface="DejaVu Sans"/>
+              </a:rPr>
+              <a:t>Without reviews</a:t>
+            </a:r>
             <a:endParaRPr b="0" lang="en-US" sz="2000" spc="-1" strike="noStrike">
               <a:solidFill>
                 <a:srgbClr val="000000"/>
@@ -28380,16 +28300,6 @@
                 <a:tab algn="l" pos="0"/>
               </a:tabLst>
             </a:pPr>
-            <a:r>
-              <a:rPr b="0" lang="en-US" sz="2000" spc="-1" strike="noStrike">
-                <a:solidFill>
-                  <a:srgbClr val="000000"/>
-                </a:solidFill>
-                <a:latin typeface="DejaVu Sans"/>
-                <a:ea typeface="DejaVu Sans"/>
-              </a:rPr>
-              <a:t>With reviews (ideally):</a:t>
-            </a:r>
             <a:endParaRPr b="0" lang="en-US" sz="2000" spc="-1" strike="noStrike">
               <a:solidFill>
                 <a:srgbClr val="000000"/>
@@ -28410,6 +28320,16 @@
                 <a:tab algn="l" pos="0"/>
               </a:tabLst>
             </a:pPr>
+            <a:r>
+              <a:rPr b="0" lang="en-US" sz="2000" spc="-1" strike="noStrike">
+                <a:solidFill>
+                  <a:srgbClr val="000000"/>
+                </a:solidFill>
+                <a:latin typeface="DejaVu Sans"/>
+                <a:ea typeface="DejaVu Sans"/>
+              </a:rPr>
+              <a:t>With reviews (ideally):</a:t>
+            </a:r>
             <a:endParaRPr b="0" lang="en-US" sz="2000" spc="-1" strike="noStrike">
               <a:solidFill>
                 <a:srgbClr val="000000"/>
@@ -28497,6 +28417,26 @@
               <a:latin typeface="Arial"/>
             </a:endParaRPr>
           </a:p>
+          <a:p>
+            <a:pPr marL="216000" indent="0">
+              <a:lnSpc>
+                <a:spcPct val="100000"/>
+              </a:lnSpc>
+              <a:spcBef>
+                <a:spcPts val="1417"/>
+              </a:spcBef>
+              <a:buNone/>
+              <a:tabLst>
+                <a:tab algn="l" pos="0"/>
+              </a:tabLst>
+            </a:pPr>
+            <a:endParaRPr b="0" lang="en-US" sz="2000" spc="-1" strike="noStrike">
+              <a:solidFill>
+                <a:srgbClr val="000000"/>
+              </a:solidFill>
+              <a:latin typeface="Arial"/>
+            </a:endParaRPr>
+          </a:p>
         </p:txBody>
       </p:sp>
       <p:sp>
@@ -28508,15 +28448,15 @@
         <p:spPr>
           <a:xfrm>
             <a:off x="5147280" y="3252960"/>
-            <a:ext cx="1137600" cy="335520"/>
+            <a:ext cx="1137240" cy="335160"/>
           </a:xfrm>
           <a:custGeom>
             <a:avLst/>
             <a:gdLst>
-              <a:gd name="textAreaLeft" fmla="*/ 0 w 1137600"/>
-              <a:gd name="textAreaRight" fmla="*/ 1139400 w 1137600"/>
-              <a:gd name="textAreaTop" fmla="*/ 0 h 335520"/>
-              <a:gd name="textAreaBottom" fmla="*/ 337320 h 335520"/>
+              <a:gd name="textAreaLeft" fmla="*/ 0 w 1137240"/>
+              <a:gd name="textAreaRight" fmla="*/ 1139400 w 1137240"/>
+              <a:gd name="textAreaTop" fmla="*/ 0 h 335160"/>
+              <a:gd name="textAreaBottom" fmla="*/ 337320 h 335160"/>
             </a:gdLst>
             <a:ahLst/>
             <a:rect l="textAreaLeft" t="textAreaTop" r="textAreaRight" b="textAreaBottom"/>
@@ -28607,15 +28547,15 @@
         <p:spPr>
           <a:xfrm>
             <a:off x="6671520" y="3252960"/>
-            <a:ext cx="1137600" cy="335520"/>
+            <a:ext cx="1137240" cy="335160"/>
           </a:xfrm>
           <a:custGeom>
             <a:avLst/>
             <a:gdLst>
-              <a:gd name="textAreaLeft" fmla="*/ 0 w 1137600"/>
-              <a:gd name="textAreaRight" fmla="*/ 1139400 w 1137600"/>
-              <a:gd name="textAreaTop" fmla="*/ 0 h 335520"/>
-              <a:gd name="textAreaBottom" fmla="*/ 337320 h 335520"/>
+              <a:gd name="textAreaLeft" fmla="*/ 0 w 1137240"/>
+              <a:gd name="textAreaRight" fmla="*/ 1139400 w 1137240"/>
+              <a:gd name="textAreaTop" fmla="*/ 0 h 335160"/>
+              <a:gd name="textAreaBottom" fmla="*/ 337320 h 335160"/>
             </a:gdLst>
             <a:ahLst/>
             <a:rect l="textAreaLeft" t="textAreaTop" r="textAreaRight" b="textAreaBottom"/>
@@ -28706,15 +28646,15 @@
         <p:spPr>
           <a:xfrm>
             <a:off x="8100360" y="3252960"/>
-            <a:ext cx="1135440" cy="335520"/>
+            <a:ext cx="1135080" cy="335160"/>
           </a:xfrm>
           <a:custGeom>
             <a:avLst/>
             <a:gdLst>
-              <a:gd name="textAreaLeft" fmla="*/ 0 w 1135440"/>
-              <a:gd name="textAreaRight" fmla="*/ 1137240 w 1135440"/>
-              <a:gd name="textAreaTop" fmla="*/ 0 h 335520"/>
-              <a:gd name="textAreaBottom" fmla="*/ 337320 h 335520"/>
+              <a:gd name="textAreaLeft" fmla="*/ 0 w 1135080"/>
+              <a:gd name="textAreaRight" fmla="*/ 1137240 w 1135080"/>
+              <a:gd name="textAreaTop" fmla="*/ 0 h 335160"/>
+              <a:gd name="textAreaBottom" fmla="*/ 337320 h 335160"/>
             </a:gdLst>
             <a:ahLst/>
             <a:rect l="textAreaLeft" t="textAreaTop" r="textAreaRight" b="textAreaBottom"/>
@@ -28805,15 +28745,15 @@
         <p:spPr>
           <a:xfrm>
             <a:off x="3530520" y="3252960"/>
-            <a:ext cx="1135080" cy="335520"/>
+            <a:ext cx="1134720" cy="335160"/>
           </a:xfrm>
           <a:custGeom>
             <a:avLst/>
             <a:gdLst>
-              <a:gd name="textAreaLeft" fmla="*/ 0 w 1135080"/>
-              <a:gd name="textAreaRight" fmla="*/ 1136880 w 1135080"/>
-              <a:gd name="textAreaTop" fmla="*/ 0 h 335520"/>
-              <a:gd name="textAreaBottom" fmla="*/ 337320 h 335520"/>
+              <a:gd name="textAreaLeft" fmla="*/ 0 w 1134720"/>
+              <a:gd name="textAreaRight" fmla="*/ 1136880 w 1134720"/>
+              <a:gd name="textAreaTop" fmla="*/ 0 h 335160"/>
+              <a:gd name="textAreaBottom" fmla="*/ 337320 h 335160"/>
             </a:gdLst>
             <a:ahLst/>
             <a:rect l="textAreaLeft" t="textAreaTop" r="textAreaRight" b="textAreaBottom"/>
@@ -28904,15 +28844,15 @@
         <p:spPr>
           <a:xfrm>
             <a:off x="9527040" y="3252960"/>
-            <a:ext cx="1708920" cy="335520"/>
+            <a:ext cx="1708560" cy="335160"/>
           </a:xfrm>
           <a:custGeom>
             <a:avLst/>
             <a:gdLst>
-              <a:gd name="textAreaLeft" fmla="*/ 0 w 1708920"/>
-              <a:gd name="textAreaRight" fmla="*/ 1710720 w 1708920"/>
-              <a:gd name="textAreaTop" fmla="*/ 0 h 335520"/>
-              <a:gd name="textAreaBottom" fmla="*/ 337320 h 335520"/>
+              <a:gd name="textAreaLeft" fmla="*/ 0 w 1708560"/>
+              <a:gd name="textAreaRight" fmla="*/ 1710720 w 1708560"/>
+              <a:gd name="textAreaTop" fmla="*/ 0 h 335160"/>
+              <a:gd name="textAreaBottom" fmla="*/ 337320 h 335160"/>
             </a:gdLst>
             <a:ahLst/>
             <a:rect l="textAreaLeft" t="textAreaTop" r="textAreaRight" b="textAreaBottom"/>
@@ -29003,7 +28943,7 @@
         <p:spPr>
           <a:xfrm>
             <a:off x="8005320" y="3557880"/>
-            <a:ext cx="2944800" cy="70200"/>
+            <a:ext cx="2944440" cy="69840"/>
           </a:xfrm>
           <a:prstGeom prst="rect">
             <a:avLst/>
@@ -29053,15 +28993,15 @@
         <p:spPr>
           <a:xfrm>
             <a:off x="857160" y="3100680"/>
-            <a:ext cx="2191320" cy="305280"/>
+            <a:ext cx="2190960" cy="304920"/>
           </a:xfrm>
           <a:custGeom>
             <a:avLst/>
             <a:gdLst>
-              <a:gd name="textAreaLeft" fmla="*/ 0 w 2191320"/>
-              <a:gd name="textAreaRight" fmla="*/ 2193120 w 2191320"/>
-              <a:gd name="textAreaTop" fmla="*/ 0 h 305280"/>
-              <a:gd name="textAreaBottom" fmla="*/ 307080 h 305280"/>
+              <a:gd name="textAreaLeft" fmla="*/ 0 w 2190960"/>
+              <a:gd name="textAreaRight" fmla="*/ 2193120 w 2190960"/>
+              <a:gd name="textAreaTop" fmla="*/ 0 h 304920"/>
+              <a:gd name="textAreaBottom" fmla="*/ 307080 h 304920"/>
             </a:gdLst>
             <a:ahLst/>
             <a:rect l="textAreaLeft" t="textAreaTop" r="textAreaRight" b="textAreaBottom"/>
@@ -29194,15 +29134,15 @@
         <p:spPr>
           <a:xfrm>
             <a:off x="952200" y="2490840"/>
-            <a:ext cx="2113560" cy="305280"/>
+            <a:ext cx="2113200" cy="304920"/>
           </a:xfrm>
           <a:custGeom>
             <a:avLst/>
             <a:gdLst>
-              <a:gd name="textAreaLeft" fmla="*/ 0 w 2113560"/>
-              <a:gd name="textAreaRight" fmla="*/ 2115360 w 2113560"/>
-              <a:gd name="textAreaTop" fmla="*/ 0 h 305280"/>
-              <a:gd name="textAreaBottom" fmla="*/ 307080 h 305280"/>
+              <a:gd name="textAreaLeft" fmla="*/ 0 w 2113200"/>
+              <a:gd name="textAreaRight" fmla="*/ 2115360 w 2113200"/>
+              <a:gd name="textAreaTop" fmla="*/ 0 h 304920"/>
+              <a:gd name="textAreaBottom" fmla="*/ 307080 h 304920"/>
             </a:gdLst>
             <a:ahLst/>
             <a:rect l="textAreaLeft" t="textAreaTop" r="textAreaRight" b="textAreaBottom"/>
@@ -29293,7 +29233,7 @@
         <p:spPr>
           <a:xfrm>
             <a:off x="3244680" y="2490840"/>
-            <a:ext cx="89640" cy="299160"/>
+            <a:ext cx="89280" cy="298800"/>
           </a:xfrm>
           <a:prstGeom prst="rect">
             <a:avLst/>
@@ -29341,7 +29281,7 @@
         <p:spPr>
           <a:xfrm>
             <a:off x="4861800" y="2490840"/>
-            <a:ext cx="89640" cy="299160"/>
+            <a:ext cx="89280" cy="298800"/>
           </a:xfrm>
           <a:prstGeom prst="rect">
             <a:avLst/>
@@ -29389,7 +29329,7 @@
         <p:spPr>
           <a:xfrm>
             <a:off x="6386040" y="2490840"/>
-            <a:ext cx="89640" cy="299160"/>
+            <a:ext cx="89280" cy="298800"/>
           </a:xfrm>
           <a:prstGeom prst="rect">
             <a:avLst/>
@@ -29437,7 +29377,7 @@
         <p:spPr>
           <a:xfrm>
             <a:off x="7909920" y="2490840"/>
-            <a:ext cx="89640" cy="299160"/>
+            <a:ext cx="89280" cy="298800"/>
           </a:xfrm>
           <a:prstGeom prst="rect">
             <a:avLst/>
@@ -29485,7 +29425,7 @@
         <p:spPr>
           <a:xfrm>
             <a:off x="9431640" y="2490840"/>
-            <a:ext cx="89280" cy="299160"/>
+            <a:ext cx="88920" cy="298800"/>
           </a:xfrm>
           <a:prstGeom prst="rect">
             <a:avLst/>
@@ -29533,7 +29473,7 @@
         <p:spPr>
           <a:xfrm>
             <a:off x="10860480" y="2490840"/>
-            <a:ext cx="89640" cy="299160"/>
+            <a:ext cx="89280" cy="298800"/>
           </a:xfrm>
           <a:prstGeom prst="rect">
             <a:avLst/>
@@ -29623,7 +29563,7 @@
         <p:spPr>
           <a:xfrm>
             <a:off x="3244680" y="3100680"/>
-            <a:ext cx="89640" cy="298800"/>
+            <a:ext cx="89280" cy="298440"/>
           </a:xfrm>
           <a:prstGeom prst="rect">
             <a:avLst/>
@@ -29671,7 +29611,7 @@
         <p:spPr>
           <a:xfrm>
             <a:off x="4861800" y="3100680"/>
-            <a:ext cx="89640" cy="298800"/>
+            <a:ext cx="89280" cy="298440"/>
           </a:xfrm>
           <a:prstGeom prst="rect">
             <a:avLst/>
@@ -29719,7 +29659,7 @@
         <p:spPr>
           <a:xfrm>
             <a:off x="6386040" y="3100680"/>
-            <a:ext cx="89640" cy="298800"/>
+            <a:ext cx="89280" cy="298440"/>
           </a:xfrm>
           <a:prstGeom prst="rect">
             <a:avLst/>
@@ -29767,7 +29707,7 @@
         <p:spPr>
           <a:xfrm>
             <a:off x="7909920" y="3100680"/>
-            <a:ext cx="89640" cy="298800"/>
+            <a:ext cx="89280" cy="298440"/>
           </a:xfrm>
           <a:prstGeom prst="rect">
             <a:avLst/>
@@ -29815,7 +29755,7 @@
         <p:spPr>
           <a:xfrm>
             <a:off x="9431640" y="3100680"/>
-            <a:ext cx="89280" cy="298800"/>
+            <a:ext cx="88920" cy="298440"/>
           </a:xfrm>
           <a:prstGeom prst="rect">
             <a:avLst/>
@@ -29863,7 +29803,7 @@
         <p:spPr>
           <a:xfrm>
             <a:off x="10860480" y="3100680"/>
-            <a:ext cx="89640" cy="298800"/>
+            <a:ext cx="89280" cy="298440"/>
           </a:xfrm>
           <a:prstGeom prst="rect">
             <a:avLst/>
@@ -30168,15 +30108,15 @@
         <p:spPr>
           <a:xfrm>
             <a:off x="8481600" y="3633840"/>
-            <a:ext cx="1896840" cy="366480"/>
+            <a:ext cx="1896480" cy="366120"/>
           </a:xfrm>
           <a:custGeom>
             <a:avLst/>
             <a:gdLst>
-              <a:gd name="textAreaLeft" fmla="*/ 0 w 1896840"/>
-              <a:gd name="textAreaRight" fmla="*/ 1898640 w 1896840"/>
-              <a:gd name="textAreaTop" fmla="*/ 0 h 366480"/>
-              <a:gd name="textAreaBottom" fmla="*/ 368280 h 366480"/>
+              <a:gd name="textAreaLeft" fmla="*/ 0 w 1896480"/>
+              <a:gd name="textAreaRight" fmla="*/ 1898640 w 1896480"/>
+              <a:gd name="textAreaTop" fmla="*/ 0 h 366120"/>
+              <a:gd name="textAreaBottom" fmla="*/ 368280 h 366120"/>
             </a:gdLst>
             <a:ahLst/>
             <a:rect l="textAreaLeft" t="textAreaTop" r="textAreaRight" b="textAreaBottom"/>
@@ -30309,7 +30249,7 @@
         <p:spPr>
           <a:xfrm>
             <a:off x="7909920" y="3405240"/>
-            <a:ext cx="89640" cy="222840"/>
+            <a:ext cx="89280" cy="222480"/>
           </a:xfrm>
           <a:prstGeom prst="rect">
             <a:avLst/>
@@ -30359,7 +30299,7 @@
         <p:spPr>
           <a:xfrm>
             <a:off x="10860120" y="3405240"/>
-            <a:ext cx="87480" cy="222840"/>
+            <a:ext cx="87120" cy="222480"/>
           </a:xfrm>
           <a:prstGeom prst="rect">
             <a:avLst/>
@@ -30409,15 +30349,15 @@
         <p:spPr>
           <a:xfrm>
             <a:off x="5147280" y="5497560"/>
-            <a:ext cx="1137600" cy="335520"/>
+            <a:ext cx="1137240" cy="335160"/>
           </a:xfrm>
           <a:custGeom>
             <a:avLst/>
             <a:gdLst>
-              <a:gd name="textAreaLeft" fmla="*/ 0 w 1137600"/>
-              <a:gd name="textAreaRight" fmla="*/ 1139400 w 1137600"/>
-              <a:gd name="textAreaTop" fmla="*/ 0 h 335520"/>
-              <a:gd name="textAreaBottom" fmla="*/ 337320 h 335520"/>
+              <a:gd name="textAreaLeft" fmla="*/ 0 w 1137240"/>
+              <a:gd name="textAreaRight" fmla="*/ 1139400 w 1137240"/>
+              <a:gd name="textAreaTop" fmla="*/ 0 h 335160"/>
+              <a:gd name="textAreaBottom" fmla="*/ 337320 h 335160"/>
             </a:gdLst>
             <a:ahLst/>
             <a:rect l="textAreaLeft" t="textAreaTop" r="textAreaRight" b="textAreaBottom"/>
@@ -30508,15 +30448,15 @@
         <p:spPr>
           <a:xfrm>
             <a:off x="6671520" y="5497560"/>
-            <a:ext cx="1137600" cy="335520"/>
+            <a:ext cx="1137240" cy="335160"/>
           </a:xfrm>
           <a:custGeom>
             <a:avLst/>
             <a:gdLst>
-              <a:gd name="textAreaLeft" fmla="*/ 0 w 1137600"/>
-              <a:gd name="textAreaRight" fmla="*/ 1139400 w 1137600"/>
-              <a:gd name="textAreaTop" fmla="*/ 0 h 335520"/>
-              <a:gd name="textAreaBottom" fmla="*/ 337320 h 335520"/>
+              <a:gd name="textAreaLeft" fmla="*/ 0 w 1137240"/>
+              <a:gd name="textAreaRight" fmla="*/ 1139400 w 1137240"/>
+              <a:gd name="textAreaTop" fmla="*/ 0 h 335160"/>
+              <a:gd name="textAreaBottom" fmla="*/ 337320 h 335160"/>
             </a:gdLst>
             <a:ahLst/>
             <a:rect l="textAreaLeft" t="textAreaTop" r="textAreaRight" b="textAreaBottom"/>
@@ -30607,15 +30547,15 @@
         <p:spPr>
           <a:xfrm>
             <a:off x="8100360" y="5497560"/>
-            <a:ext cx="1135440" cy="335520"/>
+            <a:ext cx="1135080" cy="335160"/>
           </a:xfrm>
           <a:custGeom>
             <a:avLst/>
             <a:gdLst>
-              <a:gd name="textAreaLeft" fmla="*/ 0 w 1135440"/>
-              <a:gd name="textAreaRight" fmla="*/ 1137240 w 1135440"/>
-              <a:gd name="textAreaTop" fmla="*/ 0 h 335520"/>
-              <a:gd name="textAreaBottom" fmla="*/ 337320 h 335520"/>
+              <a:gd name="textAreaLeft" fmla="*/ 0 w 1135080"/>
+              <a:gd name="textAreaRight" fmla="*/ 1137240 w 1135080"/>
+              <a:gd name="textAreaTop" fmla="*/ 0 h 335160"/>
+              <a:gd name="textAreaBottom" fmla="*/ 337320 h 335160"/>
             </a:gdLst>
             <a:ahLst/>
             <a:rect l="textAreaLeft" t="textAreaTop" r="textAreaRight" b="textAreaBottom"/>
@@ -30706,15 +30646,15 @@
         <p:spPr>
           <a:xfrm>
             <a:off x="3530520" y="5497560"/>
-            <a:ext cx="1135080" cy="335520"/>
+            <a:ext cx="1134720" cy="335160"/>
           </a:xfrm>
           <a:custGeom>
             <a:avLst/>
             <a:gdLst>
-              <a:gd name="textAreaLeft" fmla="*/ 0 w 1135080"/>
-              <a:gd name="textAreaRight" fmla="*/ 1136880 w 1135080"/>
-              <a:gd name="textAreaTop" fmla="*/ 0 h 335520"/>
-              <a:gd name="textAreaBottom" fmla="*/ 337320 h 335520"/>
+              <a:gd name="textAreaLeft" fmla="*/ 0 w 1134720"/>
+              <a:gd name="textAreaRight" fmla="*/ 1136880 w 1134720"/>
+              <a:gd name="textAreaTop" fmla="*/ 0 h 335160"/>
+              <a:gd name="textAreaBottom" fmla="*/ 337320 h 335160"/>
             </a:gdLst>
             <a:ahLst/>
             <a:rect l="textAreaLeft" t="textAreaTop" r="textAreaRight" b="textAreaBottom"/>
@@ -30805,15 +30745,15 @@
         <p:spPr>
           <a:xfrm>
             <a:off x="9527040" y="5497560"/>
-            <a:ext cx="1708920" cy="335520"/>
+            <a:ext cx="1708560" cy="335160"/>
           </a:xfrm>
           <a:custGeom>
             <a:avLst/>
             <a:gdLst>
-              <a:gd name="textAreaLeft" fmla="*/ 0 w 1708920"/>
-              <a:gd name="textAreaRight" fmla="*/ 1710720 w 1708920"/>
-              <a:gd name="textAreaTop" fmla="*/ 0 h 335520"/>
-              <a:gd name="textAreaBottom" fmla="*/ 337320 h 335520"/>
+              <a:gd name="textAreaLeft" fmla="*/ 0 w 1708560"/>
+              <a:gd name="textAreaRight" fmla="*/ 1710720 w 1708560"/>
+              <a:gd name="textAreaTop" fmla="*/ 0 h 335160"/>
+              <a:gd name="textAreaBottom" fmla="*/ 337320 h 335160"/>
             </a:gdLst>
             <a:ahLst/>
             <a:rect l="textAreaLeft" t="textAreaTop" r="textAreaRight" b="textAreaBottom"/>
@@ -30904,15 +30844,15 @@
         <p:spPr>
           <a:xfrm>
             <a:off x="857160" y="5345280"/>
-            <a:ext cx="2191320" cy="305280"/>
+            <a:ext cx="2190960" cy="304920"/>
           </a:xfrm>
           <a:custGeom>
             <a:avLst/>
             <a:gdLst>
-              <a:gd name="textAreaLeft" fmla="*/ 0 w 2191320"/>
-              <a:gd name="textAreaRight" fmla="*/ 2193120 w 2191320"/>
-              <a:gd name="textAreaTop" fmla="*/ 0 h 305280"/>
-              <a:gd name="textAreaBottom" fmla="*/ 307080 h 305280"/>
+              <a:gd name="textAreaLeft" fmla="*/ 0 w 2190960"/>
+              <a:gd name="textAreaRight" fmla="*/ 2193120 w 2190960"/>
+              <a:gd name="textAreaTop" fmla="*/ 0 h 304920"/>
+              <a:gd name="textAreaBottom" fmla="*/ 307080 h 304920"/>
             </a:gdLst>
             <a:ahLst/>
             <a:rect l="textAreaLeft" t="textAreaTop" r="textAreaRight" b="textAreaBottom"/>
@@ -31045,15 +30985,15 @@
         <p:spPr>
           <a:xfrm>
             <a:off x="952200" y="4735800"/>
-            <a:ext cx="2096280" cy="305280"/>
+            <a:ext cx="2095920" cy="304920"/>
           </a:xfrm>
           <a:custGeom>
             <a:avLst/>
             <a:gdLst>
-              <a:gd name="textAreaLeft" fmla="*/ 0 w 2096280"/>
-              <a:gd name="textAreaRight" fmla="*/ 2098080 w 2096280"/>
-              <a:gd name="textAreaTop" fmla="*/ 0 h 305280"/>
-              <a:gd name="textAreaBottom" fmla="*/ 307080 h 305280"/>
+              <a:gd name="textAreaLeft" fmla="*/ 0 w 2095920"/>
+              <a:gd name="textAreaRight" fmla="*/ 2098080 w 2095920"/>
+              <a:gd name="textAreaTop" fmla="*/ 0 h 304920"/>
+              <a:gd name="textAreaBottom" fmla="*/ 307080 h 304920"/>
             </a:gdLst>
             <a:ahLst/>
             <a:rect l="textAreaLeft" t="textAreaTop" r="textAreaRight" b="textAreaBottom"/>
@@ -31144,15 +31084,15 @@
         <p:spPr>
           <a:xfrm>
             <a:off x="5147280" y="4583160"/>
-            <a:ext cx="1137600" cy="335520"/>
+            <a:ext cx="1137240" cy="335160"/>
           </a:xfrm>
           <a:custGeom>
             <a:avLst/>
             <a:gdLst>
-              <a:gd name="textAreaLeft" fmla="*/ 0 w 1137600"/>
-              <a:gd name="textAreaRight" fmla="*/ 1139400 w 1137600"/>
-              <a:gd name="textAreaTop" fmla="*/ 0 h 335520"/>
-              <a:gd name="textAreaBottom" fmla="*/ 337320 h 335520"/>
+              <a:gd name="textAreaLeft" fmla="*/ 0 w 1137240"/>
+              <a:gd name="textAreaRight" fmla="*/ 1139400 w 1137240"/>
+              <a:gd name="textAreaTop" fmla="*/ 0 h 335160"/>
+              <a:gd name="textAreaBottom" fmla="*/ 337320 h 335160"/>
             </a:gdLst>
             <a:ahLst/>
             <a:rect l="textAreaLeft" t="textAreaTop" r="textAreaRight" b="textAreaBottom"/>
@@ -31243,15 +31183,15 @@
         <p:spPr>
           <a:xfrm>
             <a:off x="6671520" y="4583160"/>
-            <a:ext cx="1137600" cy="335520"/>
+            <a:ext cx="1137240" cy="335160"/>
           </a:xfrm>
           <a:custGeom>
             <a:avLst/>
             <a:gdLst>
-              <a:gd name="textAreaLeft" fmla="*/ 0 w 1137600"/>
-              <a:gd name="textAreaRight" fmla="*/ 1139400 w 1137600"/>
-              <a:gd name="textAreaTop" fmla="*/ 0 h 335520"/>
-              <a:gd name="textAreaBottom" fmla="*/ 337320 h 335520"/>
+              <a:gd name="textAreaLeft" fmla="*/ 0 w 1137240"/>
+              <a:gd name="textAreaRight" fmla="*/ 1139400 w 1137240"/>
+              <a:gd name="textAreaTop" fmla="*/ 0 h 335160"/>
+              <a:gd name="textAreaBottom" fmla="*/ 337320 h 335160"/>
             </a:gdLst>
             <a:ahLst/>
             <a:rect l="textAreaLeft" t="textAreaTop" r="textAreaRight" b="textAreaBottom"/>
@@ -31342,15 +31282,15 @@
         <p:spPr>
           <a:xfrm>
             <a:off x="8100360" y="4583160"/>
-            <a:ext cx="1135440" cy="335520"/>
+            <a:ext cx="1135080" cy="335160"/>
           </a:xfrm>
           <a:custGeom>
             <a:avLst/>
             <a:gdLst>
-              <a:gd name="textAreaLeft" fmla="*/ 0 w 1135440"/>
-              <a:gd name="textAreaRight" fmla="*/ 1137240 w 1135440"/>
-              <a:gd name="textAreaTop" fmla="*/ 0 h 335520"/>
-              <a:gd name="textAreaBottom" fmla="*/ 337320 h 335520"/>
+              <a:gd name="textAreaLeft" fmla="*/ 0 w 1135080"/>
+              <a:gd name="textAreaRight" fmla="*/ 1137240 w 1135080"/>
+              <a:gd name="textAreaTop" fmla="*/ 0 h 335160"/>
+              <a:gd name="textAreaBottom" fmla="*/ 337320 h 335160"/>
             </a:gdLst>
             <a:ahLst/>
             <a:rect l="textAreaLeft" t="textAreaTop" r="textAreaRight" b="textAreaBottom"/>
@@ -31441,15 +31381,15 @@
         <p:spPr>
           <a:xfrm>
             <a:off x="3530520" y="4583160"/>
-            <a:ext cx="1135080" cy="335520"/>
+            <a:ext cx="1134720" cy="335160"/>
           </a:xfrm>
           <a:custGeom>
             <a:avLst/>
             <a:gdLst>
-              <a:gd name="textAreaLeft" fmla="*/ 0 w 1135080"/>
-              <a:gd name="textAreaRight" fmla="*/ 1136880 w 1135080"/>
-              <a:gd name="textAreaTop" fmla="*/ 0 h 335520"/>
-              <a:gd name="textAreaBottom" fmla="*/ 337320 h 335520"/>
+              <a:gd name="textAreaLeft" fmla="*/ 0 w 1134720"/>
+              <a:gd name="textAreaRight" fmla="*/ 1136880 w 1134720"/>
+              <a:gd name="textAreaTop" fmla="*/ 0 h 335160"/>
+              <a:gd name="textAreaBottom" fmla="*/ 337320 h 335160"/>
             </a:gdLst>
             <a:ahLst/>
             <a:rect l="textAreaLeft" t="textAreaTop" r="textAreaRight" b="textAreaBottom"/>
@@ -31540,15 +31480,15 @@
         <p:spPr>
           <a:xfrm>
             <a:off x="9527040" y="4583160"/>
-            <a:ext cx="1708920" cy="335520"/>
+            <a:ext cx="1708560" cy="335160"/>
           </a:xfrm>
           <a:custGeom>
             <a:avLst/>
             <a:gdLst>
-              <a:gd name="textAreaLeft" fmla="*/ 0 w 1708920"/>
-              <a:gd name="textAreaRight" fmla="*/ 1710720 w 1708920"/>
-              <a:gd name="textAreaTop" fmla="*/ 0 h 335520"/>
-              <a:gd name="textAreaBottom" fmla="*/ 337320 h 335520"/>
+              <a:gd name="textAreaLeft" fmla="*/ 0 w 1708560"/>
+              <a:gd name="textAreaRight" fmla="*/ 1710720 w 1708560"/>
+              <a:gd name="textAreaTop" fmla="*/ 0 h 335160"/>
+              <a:gd name="textAreaBottom" fmla="*/ 337320 h 335160"/>
             </a:gdLst>
             <a:ahLst/>
             <a:rect l="textAreaLeft" t="textAreaTop" r="textAreaRight" b="textAreaBottom"/>
@@ -31639,7 +31579,7 @@
         <p:spPr>
           <a:xfrm>
             <a:off x="3244680" y="4735800"/>
-            <a:ext cx="89640" cy="298800"/>
+            <a:ext cx="89280" cy="298440"/>
           </a:xfrm>
           <a:prstGeom prst="rect">
             <a:avLst/>
@@ -31687,7 +31627,7 @@
         <p:spPr>
           <a:xfrm>
             <a:off x="4861800" y="4735800"/>
-            <a:ext cx="89640" cy="298800"/>
+            <a:ext cx="89280" cy="298440"/>
           </a:xfrm>
           <a:prstGeom prst="rect">
             <a:avLst/>
@@ -31735,7 +31675,7 @@
         <p:spPr>
           <a:xfrm>
             <a:off x="6386040" y="4735800"/>
-            <a:ext cx="89640" cy="298800"/>
+            <a:ext cx="89280" cy="298440"/>
           </a:xfrm>
           <a:prstGeom prst="rect">
             <a:avLst/>
@@ -31783,7 +31723,7 @@
         <p:spPr>
           <a:xfrm>
             <a:off x="7909920" y="4735800"/>
-            <a:ext cx="89640" cy="298800"/>
+            <a:ext cx="89280" cy="298440"/>
           </a:xfrm>
           <a:prstGeom prst="rect">
             <a:avLst/>
@@ -31831,7 +31771,7 @@
         <p:spPr>
           <a:xfrm>
             <a:off x="9431640" y="4735800"/>
-            <a:ext cx="89280" cy="298800"/>
+            <a:ext cx="88920" cy="298440"/>
           </a:xfrm>
           <a:prstGeom prst="rect">
             <a:avLst/>
@@ -31879,7 +31819,7 @@
         <p:spPr>
           <a:xfrm>
             <a:off x="10860480" y="4735800"/>
-            <a:ext cx="89640" cy="298800"/>
+            <a:ext cx="89280" cy="298440"/>
           </a:xfrm>
           <a:prstGeom prst="rect">
             <a:avLst/>
@@ -31969,7 +31909,7 @@
         <p:spPr>
           <a:xfrm>
             <a:off x="3244680" y="5345280"/>
-            <a:ext cx="89640" cy="299160"/>
+            <a:ext cx="89280" cy="298800"/>
           </a:xfrm>
           <a:prstGeom prst="rect">
             <a:avLst/>
@@ -32017,7 +31957,7 @@
         <p:spPr>
           <a:xfrm>
             <a:off x="4861800" y="5345280"/>
-            <a:ext cx="89640" cy="299160"/>
+            <a:ext cx="89280" cy="298800"/>
           </a:xfrm>
           <a:prstGeom prst="rect">
             <a:avLst/>
@@ -32065,7 +32005,7 @@
         <p:spPr>
           <a:xfrm>
             <a:off x="6386040" y="5345280"/>
-            <a:ext cx="89640" cy="299160"/>
+            <a:ext cx="89280" cy="298800"/>
           </a:xfrm>
           <a:prstGeom prst="rect">
             <a:avLst/>
@@ -32113,7 +32053,7 @@
         <p:spPr>
           <a:xfrm>
             <a:off x="7909920" y="5345280"/>
-            <a:ext cx="89640" cy="299160"/>
+            <a:ext cx="89280" cy="298800"/>
           </a:xfrm>
           <a:prstGeom prst="rect">
             <a:avLst/>
@@ -32161,7 +32101,7 @@
         <p:spPr>
           <a:xfrm>
             <a:off x="9431640" y="5345280"/>
-            <a:ext cx="89280" cy="299160"/>
+            <a:ext cx="88920" cy="298800"/>
           </a:xfrm>
           <a:prstGeom prst="rect">
             <a:avLst/>
@@ -32209,7 +32149,7 @@
         <p:spPr>
           <a:xfrm>
             <a:off x="10860480" y="5345280"/>
-            <a:ext cx="89640" cy="299160"/>
+            <a:ext cx="89280" cy="298800"/>
           </a:xfrm>
           <a:prstGeom prst="rect">
             <a:avLst/>
@@ -32514,15 +32454,15 @@
         <p:spPr>
           <a:xfrm>
             <a:off x="5141520" y="2342160"/>
-            <a:ext cx="1137600" cy="335520"/>
+            <a:ext cx="1137240" cy="335160"/>
           </a:xfrm>
           <a:custGeom>
             <a:avLst/>
             <a:gdLst>
-              <a:gd name="textAreaLeft" fmla="*/ 0 w 1137600"/>
-              <a:gd name="textAreaRight" fmla="*/ 1139400 w 1137600"/>
-              <a:gd name="textAreaTop" fmla="*/ 0 h 335520"/>
-              <a:gd name="textAreaBottom" fmla="*/ 337320 h 335520"/>
+              <a:gd name="textAreaLeft" fmla="*/ 0 w 1137240"/>
+              <a:gd name="textAreaRight" fmla="*/ 1139400 w 1137240"/>
+              <a:gd name="textAreaTop" fmla="*/ 0 h 335160"/>
+              <a:gd name="textAreaBottom" fmla="*/ 337320 h 335160"/>
             </a:gdLst>
             <a:ahLst/>
             <a:rect l="textAreaLeft" t="textAreaTop" r="textAreaRight" b="textAreaBottom"/>
@@ -32613,15 +32553,15 @@
         <p:spPr>
           <a:xfrm>
             <a:off x="6665760" y="2342160"/>
-            <a:ext cx="1137600" cy="335520"/>
+            <a:ext cx="1137240" cy="335160"/>
           </a:xfrm>
           <a:custGeom>
             <a:avLst/>
             <a:gdLst>
-              <a:gd name="textAreaLeft" fmla="*/ 0 w 1137600"/>
-              <a:gd name="textAreaRight" fmla="*/ 1139400 w 1137600"/>
-              <a:gd name="textAreaTop" fmla="*/ 0 h 335520"/>
-              <a:gd name="textAreaBottom" fmla="*/ 337320 h 335520"/>
+              <a:gd name="textAreaLeft" fmla="*/ 0 w 1137240"/>
+              <a:gd name="textAreaRight" fmla="*/ 1139400 w 1137240"/>
+              <a:gd name="textAreaTop" fmla="*/ 0 h 335160"/>
+              <a:gd name="textAreaBottom" fmla="*/ 337320 h 335160"/>
             </a:gdLst>
             <a:ahLst/>
             <a:rect l="textAreaLeft" t="textAreaTop" r="textAreaRight" b="textAreaBottom"/>
@@ -32712,15 +32652,15 @@
         <p:spPr>
           <a:xfrm>
             <a:off x="8094600" y="2342160"/>
-            <a:ext cx="1135440" cy="335520"/>
+            <a:ext cx="1135080" cy="335160"/>
           </a:xfrm>
           <a:custGeom>
             <a:avLst/>
             <a:gdLst>
-              <a:gd name="textAreaLeft" fmla="*/ 0 w 1135440"/>
-              <a:gd name="textAreaRight" fmla="*/ 1137240 w 1135440"/>
-              <a:gd name="textAreaTop" fmla="*/ 0 h 335520"/>
-              <a:gd name="textAreaBottom" fmla="*/ 337320 h 335520"/>
+              <a:gd name="textAreaLeft" fmla="*/ 0 w 1135080"/>
+              <a:gd name="textAreaRight" fmla="*/ 1137240 w 1135080"/>
+              <a:gd name="textAreaTop" fmla="*/ 0 h 335160"/>
+              <a:gd name="textAreaBottom" fmla="*/ 337320 h 335160"/>
             </a:gdLst>
             <a:ahLst/>
             <a:rect l="textAreaLeft" t="textAreaTop" r="textAreaRight" b="textAreaBottom"/>
@@ -32811,15 +32751,15 @@
         <p:spPr>
           <a:xfrm>
             <a:off x="3524760" y="2342160"/>
-            <a:ext cx="1135080" cy="335520"/>
+            <a:ext cx="1134720" cy="335160"/>
           </a:xfrm>
           <a:custGeom>
             <a:avLst/>
             <a:gdLst>
-              <a:gd name="textAreaLeft" fmla="*/ 0 w 1135080"/>
-              <a:gd name="textAreaRight" fmla="*/ 1136880 w 1135080"/>
-              <a:gd name="textAreaTop" fmla="*/ 0 h 335520"/>
-              <a:gd name="textAreaBottom" fmla="*/ 337320 h 335520"/>
+              <a:gd name="textAreaLeft" fmla="*/ 0 w 1134720"/>
+              <a:gd name="textAreaRight" fmla="*/ 1136880 w 1134720"/>
+              <a:gd name="textAreaTop" fmla="*/ 0 h 335160"/>
+              <a:gd name="textAreaBottom" fmla="*/ 337320 h 335160"/>
             </a:gdLst>
             <a:ahLst/>
             <a:rect l="textAreaLeft" t="textAreaTop" r="textAreaRight" b="textAreaBottom"/>
@@ -32910,15 +32850,15 @@
         <p:spPr>
           <a:xfrm>
             <a:off x="9521280" y="2342160"/>
-            <a:ext cx="1708920" cy="335520"/>
+            <a:ext cx="1708560" cy="335160"/>
           </a:xfrm>
           <a:custGeom>
             <a:avLst/>
             <a:gdLst>
-              <a:gd name="textAreaLeft" fmla="*/ 0 w 1708920"/>
-              <a:gd name="textAreaRight" fmla="*/ 1710720 w 1708920"/>
-              <a:gd name="textAreaTop" fmla="*/ 0 h 335520"/>
-              <a:gd name="textAreaBottom" fmla="*/ 337320 h 335520"/>
+              <a:gd name="textAreaLeft" fmla="*/ 0 w 1708560"/>
+              <a:gd name="textAreaRight" fmla="*/ 1710720 w 1708560"/>
+              <a:gd name="textAreaTop" fmla="*/ 0 h 335160"/>
+              <a:gd name="textAreaBottom" fmla="*/ 337320 h 335160"/>
             </a:gdLst>
             <a:ahLst/>
             <a:rect l="textAreaLeft" t="textAreaTop" r="textAreaRight" b="textAreaBottom"/>
@@ -33081,7 +33021,7 @@
         <p:spPr>
           <a:xfrm>
             <a:off x="542880" y="721800"/>
-            <a:ext cx="10355040" cy="495720"/>
+            <a:ext cx="10354680" cy="495360"/>
           </a:xfrm>
           <a:prstGeom prst="rect">
             <a:avLst/>
@@ -33135,7 +33075,7 @@
         <p:spPr>
           <a:xfrm>
             <a:off x="542880" y="1267200"/>
-            <a:ext cx="10355040" cy="495720"/>
+            <a:ext cx="10354680" cy="495360"/>
           </a:xfrm>
           <a:prstGeom prst="rect">
             <a:avLst/>
@@ -33189,7 +33129,7 @@
         <p:spPr>
           <a:xfrm>
             <a:off x="451800" y="1709280"/>
-            <a:ext cx="8222400" cy="4350600"/>
+            <a:ext cx="8222040" cy="4350240"/>
           </a:xfrm>
           <a:prstGeom prst="rect">
             <a:avLst/>
@@ -33238,7 +33178,7 @@
         <p:spPr>
           <a:xfrm>
             <a:off x="609480" y="1769400"/>
-            <a:ext cx="10585440" cy="4853520"/>
+            <a:ext cx="10585080" cy="4853160"/>
           </a:xfrm>
           <a:prstGeom prst="rect">
             <a:avLst/>
@@ -33567,15 +33507,15 @@
         <p:spPr>
           <a:xfrm>
             <a:off x="781560" y="2725920"/>
-            <a:ext cx="1450800" cy="397080"/>
+            <a:ext cx="1450440" cy="396720"/>
           </a:xfrm>
           <a:custGeom>
             <a:avLst/>
             <a:gdLst>
-              <a:gd name="textAreaLeft" fmla="*/ 0 w 1450800"/>
-              <a:gd name="textAreaRight" fmla="*/ 1452600 w 1450800"/>
-              <a:gd name="textAreaTop" fmla="*/ 0 h 397080"/>
-              <a:gd name="textAreaBottom" fmla="*/ 398880 h 397080"/>
+              <a:gd name="textAreaLeft" fmla="*/ 0 w 1450440"/>
+              <a:gd name="textAreaRight" fmla="*/ 1452600 w 1450440"/>
+              <a:gd name="textAreaTop" fmla="*/ 0 h 396720"/>
+              <a:gd name="textAreaBottom" fmla="*/ 398880 h 396720"/>
             </a:gdLst>
             <a:ahLst/>
             <a:rect l="textAreaLeft" t="textAreaTop" r="textAreaRight" b="textAreaBottom"/>
@@ -33663,15 +33603,15 @@
         <p:spPr>
           <a:xfrm>
             <a:off x="2318400" y="2725920"/>
-            <a:ext cx="1055880" cy="702000"/>
+            <a:ext cx="1055520" cy="701640"/>
           </a:xfrm>
           <a:custGeom>
             <a:avLst/>
             <a:gdLst>
-              <a:gd name="textAreaLeft" fmla="*/ 0 w 1055880"/>
-              <a:gd name="textAreaRight" fmla="*/ 1057680 w 1055880"/>
-              <a:gd name="textAreaTop" fmla="*/ 0 h 702000"/>
-              <a:gd name="textAreaBottom" fmla="*/ 703800 h 702000"/>
+              <a:gd name="textAreaLeft" fmla="*/ 0 w 1055520"/>
+              <a:gd name="textAreaRight" fmla="*/ 1057680 w 1055520"/>
+              <a:gd name="textAreaTop" fmla="*/ 0 h 701640"/>
+              <a:gd name="textAreaBottom" fmla="*/ 703800 h 701640"/>
             </a:gdLst>
             <a:ahLst/>
             <a:rect l="textAreaLeft" t="textAreaTop" r="textAreaRight" b="textAreaBottom"/>
@@ -33772,15 +33712,15 @@
         <p:spPr>
           <a:xfrm>
             <a:off x="3738600" y="2725920"/>
-            <a:ext cx="1725120" cy="397080"/>
+            <a:ext cx="1724760" cy="396720"/>
           </a:xfrm>
           <a:custGeom>
             <a:avLst/>
             <a:gdLst>
-              <a:gd name="textAreaLeft" fmla="*/ 0 w 1725120"/>
-              <a:gd name="textAreaRight" fmla="*/ 1726920 w 1725120"/>
-              <a:gd name="textAreaTop" fmla="*/ 0 h 397080"/>
-              <a:gd name="textAreaBottom" fmla="*/ 398880 h 397080"/>
+              <a:gd name="textAreaLeft" fmla="*/ 0 w 1724760"/>
+              <a:gd name="textAreaRight" fmla="*/ 1726920 w 1724760"/>
+              <a:gd name="textAreaTop" fmla="*/ 0 h 396720"/>
+              <a:gd name="textAreaBottom" fmla="*/ 398880 h 396720"/>
             </a:gdLst>
             <a:ahLst/>
             <a:rect l="textAreaLeft" t="textAreaTop" r="textAreaRight" b="textAreaBottom"/>
@@ -33868,15 +33808,15 @@
         <p:spPr>
           <a:xfrm>
             <a:off x="5355000" y="2725920"/>
-            <a:ext cx="1830240" cy="702000"/>
+            <a:ext cx="1829880" cy="701640"/>
           </a:xfrm>
           <a:custGeom>
             <a:avLst/>
             <a:gdLst>
-              <a:gd name="textAreaLeft" fmla="*/ 0 w 1830240"/>
-              <a:gd name="textAreaRight" fmla="*/ 1832040 w 1830240"/>
-              <a:gd name="textAreaTop" fmla="*/ 0 h 702000"/>
-              <a:gd name="textAreaBottom" fmla="*/ 703800 h 702000"/>
+              <a:gd name="textAreaLeft" fmla="*/ 0 w 1829880"/>
+              <a:gd name="textAreaRight" fmla="*/ 1832040 w 1829880"/>
+              <a:gd name="textAreaTop" fmla="*/ 0 h 701640"/>
+              <a:gd name="textAreaBottom" fmla="*/ 703800 h 701640"/>
             </a:gdLst>
             <a:ahLst/>
             <a:rect l="textAreaLeft" t="textAreaTop" r="textAreaRight" b="textAreaBottom"/>
@@ -33977,15 +33917,15 @@
         <p:spPr>
           <a:xfrm>
             <a:off x="7494120" y="2725920"/>
-            <a:ext cx="2020680" cy="702000"/>
+            <a:ext cx="2020320" cy="701640"/>
           </a:xfrm>
           <a:custGeom>
             <a:avLst/>
             <a:gdLst>
-              <a:gd name="textAreaLeft" fmla="*/ 0 w 2020680"/>
-              <a:gd name="textAreaRight" fmla="*/ 2022480 w 2020680"/>
-              <a:gd name="textAreaTop" fmla="*/ 0 h 702000"/>
-              <a:gd name="textAreaBottom" fmla="*/ 703800 h 702000"/>
+              <a:gd name="textAreaLeft" fmla="*/ 0 w 2020320"/>
+              <a:gd name="textAreaRight" fmla="*/ 2022480 w 2020320"/>
+              <a:gd name="textAreaTop" fmla="*/ 0 h 701640"/>
+              <a:gd name="textAreaBottom" fmla="*/ 703800 h 701640"/>
             </a:gdLst>
             <a:ahLst/>
             <a:rect l="textAreaLeft" t="textAreaTop" r="textAreaRight" b="textAreaBottom"/>
@@ -34086,15 +34026,15 @@
         <p:spPr>
           <a:xfrm>
             <a:off x="9575280" y="2750760"/>
-            <a:ext cx="1055880" cy="397080"/>
+            <a:ext cx="1055520" cy="396720"/>
           </a:xfrm>
           <a:custGeom>
             <a:avLst/>
             <a:gdLst>
-              <a:gd name="textAreaLeft" fmla="*/ 0 w 1055880"/>
-              <a:gd name="textAreaRight" fmla="*/ 1057680 w 1055880"/>
-              <a:gd name="textAreaTop" fmla="*/ 0 h 397080"/>
-              <a:gd name="textAreaBottom" fmla="*/ 398880 h 397080"/>
+              <a:gd name="textAreaLeft" fmla="*/ 0 w 1055520"/>
+              <a:gd name="textAreaRight" fmla="*/ 1057680 w 1055520"/>
+              <a:gd name="textAreaTop" fmla="*/ 0 h 396720"/>
+              <a:gd name="textAreaBottom" fmla="*/ 398880 h 396720"/>
             </a:gdLst>
             <a:ahLst/>
             <a:rect l="textAreaLeft" t="textAreaTop" r="textAreaRight" b="textAreaBottom"/>
@@ -34392,15 +34332,15 @@
         <p:spPr>
           <a:xfrm>
             <a:off x="544320" y="2005200"/>
-            <a:ext cx="723960" cy="518400"/>
+            <a:ext cx="723600" cy="518040"/>
           </a:xfrm>
           <a:custGeom>
             <a:avLst/>
             <a:gdLst>
-              <a:gd name="textAreaLeft" fmla="*/ 0 w 723960"/>
-              <a:gd name="textAreaRight" fmla="*/ 725760 w 723960"/>
-              <a:gd name="textAreaTop" fmla="*/ 0 h 518400"/>
-              <a:gd name="textAreaBottom" fmla="*/ 520200 h 518400"/>
+              <a:gd name="textAreaLeft" fmla="*/ 0 w 723600"/>
+              <a:gd name="textAreaRight" fmla="*/ 725760 w 723600"/>
+              <a:gd name="textAreaTop" fmla="*/ 0 h 518040"/>
+              <a:gd name="textAreaBottom" fmla="*/ 520200 h 518040"/>
             </a:gdLst>
             <a:ahLst/>
             <a:rect l="textAreaLeft" t="textAreaTop" r="textAreaRight" b="textAreaBottom"/>
@@ -34525,15 +34465,15 @@
         <p:spPr>
           <a:xfrm>
             <a:off x="10045080" y="2047320"/>
-            <a:ext cx="723960" cy="518400"/>
+            <a:ext cx="723600" cy="518040"/>
           </a:xfrm>
           <a:custGeom>
             <a:avLst/>
             <a:gdLst>
-              <a:gd name="textAreaLeft" fmla="*/ 0 w 723960"/>
-              <a:gd name="textAreaRight" fmla="*/ 725760 w 723960"/>
-              <a:gd name="textAreaTop" fmla="*/ 0 h 518400"/>
-              <a:gd name="textAreaBottom" fmla="*/ 520200 h 518400"/>
+              <a:gd name="textAreaLeft" fmla="*/ 0 w 723600"/>
+              <a:gd name="textAreaRight" fmla="*/ 725760 w 723600"/>
+              <a:gd name="textAreaTop" fmla="*/ 0 h 518040"/>
+              <a:gd name="textAreaBottom" fmla="*/ 520200 h 518040"/>
             </a:gdLst>
             <a:ahLst/>
             <a:rect l="textAreaLeft" t="textAreaTop" r="textAreaRight" b="textAreaBottom"/>
@@ -34664,7 +34604,7 @@
         <p:spPr>
           <a:xfrm>
             <a:off x="542880" y="721800"/>
-            <a:ext cx="10355040" cy="495720"/>
+            <a:ext cx="10354680" cy="495360"/>
           </a:xfrm>
           <a:prstGeom prst="rect">
             <a:avLst/>
@@ -34718,7 +34658,7 @@
         <p:spPr>
           <a:xfrm>
             <a:off x="542880" y="1267200"/>
-            <a:ext cx="10355040" cy="495720"/>
+            <a:ext cx="10354680" cy="495360"/>
           </a:xfrm>
           <a:prstGeom prst="rect">
             <a:avLst/>
@@ -34772,7 +34712,7 @@
         <p:spPr>
           <a:xfrm>
             <a:off x="451800" y="1709280"/>
-            <a:ext cx="8222400" cy="4350600"/>
+            <a:ext cx="8222040" cy="4350240"/>
           </a:xfrm>
           <a:prstGeom prst="rect">
             <a:avLst/>
@@ -34821,7 +34761,7 @@
         <p:spPr>
           <a:xfrm>
             <a:off x="609480" y="1769400"/>
-            <a:ext cx="10585440" cy="4853520"/>
+            <a:ext cx="10585080" cy="4853160"/>
           </a:xfrm>
           <a:prstGeom prst="rect">
             <a:avLst/>
@@ -35166,7 +35106,7 @@
         <p:spPr>
           <a:xfrm>
             <a:off x="542880" y="721800"/>
-            <a:ext cx="10355040" cy="495720"/>
+            <a:ext cx="10354680" cy="495360"/>
           </a:xfrm>
           <a:prstGeom prst="rect">
             <a:avLst/>
@@ -35220,7 +35160,7 @@
         <p:spPr>
           <a:xfrm>
             <a:off x="542880" y="1267200"/>
-            <a:ext cx="10355040" cy="495720"/>
+            <a:ext cx="10354680" cy="495360"/>
           </a:xfrm>
           <a:prstGeom prst="rect">
             <a:avLst/>
@@ -35274,7 +35214,7 @@
         <p:spPr>
           <a:xfrm>
             <a:off x="451800" y="1709280"/>
-            <a:ext cx="8222400" cy="4350600"/>
+            <a:ext cx="8222040" cy="4350240"/>
           </a:xfrm>
           <a:prstGeom prst="rect">
             <a:avLst/>
@@ -35323,7 +35263,7 @@
         <p:spPr>
           <a:xfrm>
             <a:off x="609480" y="1769400"/>
-            <a:ext cx="10585440" cy="4853520"/>
+            <a:ext cx="10585080" cy="4853160"/>
           </a:xfrm>
           <a:prstGeom prst="rect">
             <a:avLst/>
@@ -35723,7 +35663,7 @@
         <p:spPr>
           <a:xfrm>
             <a:off x="542880" y="721800"/>
-            <a:ext cx="10352520" cy="493200"/>
+            <a:ext cx="10352160" cy="492840"/>
           </a:xfrm>
           <a:prstGeom prst="rect">
             <a:avLst/>
@@ -35787,7 +35727,7 @@
         <p:spPr>
           <a:xfrm>
             <a:off x="542880" y="1267200"/>
-            <a:ext cx="10352520" cy="493200"/>
+            <a:ext cx="10352160" cy="492840"/>
           </a:xfrm>
           <a:prstGeom prst="rect">
             <a:avLst/>
@@ -35841,7 +35781,7 @@
         <p:spPr>
           <a:xfrm>
             <a:off x="335520" y="1269000"/>
-            <a:ext cx="5598720" cy="5039280"/>
+            <a:ext cx="5598360" cy="5038920"/>
           </a:xfrm>
           <a:prstGeom prst="rect">
             <a:avLst/>
@@ -35888,7 +35828,7 @@
         <p:spPr>
           <a:xfrm>
             <a:off x="487800" y="1421280"/>
-            <a:ext cx="5598720" cy="5039280"/>
+            <a:ext cx="5598360" cy="5038920"/>
           </a:xfrm>
           <a:prstGeom prst="rect">
             <a:avLst/>
@@ -35985,7 +35925,7 @@
         <p:spPr>
           <a:xfrm>
             <a:off x="6620040" y="1869840"/>
-            <a:ext cx="4170960" cy="4170960"/>
+            <a:ext cx="4170600" cy="4170600"/>
           </a:xfrm>
           <a:prstGeom prst="rect">
             <a:avLst/>
@@ -36034,7 +35974,7 @@
         <p:spPr>
           <a:xfrm>
             <a:off x="542880" y="721800"/>
-            <a:ext cx="10355040" cy="495720"/>
+            <a:ext cx="10354680" cy="495360"/>
           </a:xfrm>
           <a:prstGeom prst="rect">
             <a:avLst/>
@@ -36088,7 +36028,7 @@
         <p:spPr>
           <a:xfrm>
             <a:off x="542880" y="1267200"/>
-            <a:ext cx="10355040" cy="495720"/>
+            <a:ext cx="10354680" cy="495360"/>
           </a:xfrm>
           <a:prstGeom prst="rect">
             <a:avLst/>
@@ -36142,7 +36082,7 @@
         <p:spPr>
           <a:xfrm>
             <a:off x="451800" y="1709280"/>
-            <a:ext cx="8222400" cy="4350600"/>
+            <a:ext cx="8222040" cy="4350240"/>
           </a:xfrm>
           <a:prstGeom prst="rect">
             <a:avLst/>
@@ -36191,7 +36131,7 @@
         <p:spPr>
           <a:xfrm>
             <a:off x="609480" y="1769400"/>
-            <a:ext cx="10585440" cy="4853520"/>
+            <a:ext cx="10585080" cy="4853160"/>
           </a:xfrm>
           <a:prstGeom prst="rect">
             <a:avLst/>
@@ -36426,7 +36366,7 @@
         <p:spPr>
           <a:xfrm>
             <a:off x="335520" y="4406760"/>
-            <a:ext cx="10746720" cy="1355760"/>
+            <a:ext cx="10746360" cy="1355400"/>
           </a:xfrm>
           <a:prstGeom prst="rect">
             <a:avLst/>
@@ -36480,7 +36420,7 @@
         <p:spPr>
           <a:xfrm>
             <a:off x="335520" y="2906640"/>
-            <a:ext cx="10746720" cy="1493640"/>
+            <a:ext cx="10746360" cy="1493280"/>
           </a:xfrm>
           <a:prstGeom prst="rect">
             <a:avLst/>
@@ -36555,7 +36495,7 @@
         <p:spPr>
           <a:xfrm>
             <a:off x="542880" y="721800"/>
-            <a:ext cx="10355040" cy="495720"/>
+            <a:ext cx="10354680" cy="495360"/>
           </a:xfrm>
           <a:prstGeom prst="rect">
             <a:avLst/>
@@ -36609,7 +36549,7 @@
         <p:spPr>
           <a:xfrm>
             <a:off x="451800" y="1709280"/>
-            <a:ext cx="8222400" cy="4350600"/>
+            <a:ext cx="8222040" cy="4350240"/>
           </a:xfrm>
           <a:prstGeom prst="rect">
             <a:avLst/>
@@ -36658,7 +36598,7 @@
         <p:spPr>
           <a:xfrm>
             <a:off x="609480" y="1769400"/>
-            <a:ext cx="10585440" cy="4853520"/>
+            <a:ext cx="10585080" cy="4853160"/>
           </a:xfrm>
           <a:prstGeom prst="rect">
             <a:avLst/>
@@ -37033,7 +36973,7 @@
         <p:spPr>
           <a:xfrm>
             <a:off x="542880" y="721800"/>
-            <a:ext cx="10352520" cy="493200"/>
+            <a:ext cx="10352160" cy="492840"/>
           </a:xfrm>
           <a:prstGeom prst="rect">
             <a:avLst/>
@@ -37097,7 +37037,7 @@
         <p:spPr>
           <a:xfrm>
             <a:off x="542880" y="1267200"/>
-            <a:ext cx="10352520" cy="493200"/>
+            <a:ext cx="10352160" cy="492840"/>
           </a:xfrm>
           <a:prstGeom prst="rect">
             <a:avLst/>
@@ -37151,7 +37091,7 @@
         <p:spPr>
           <a:xfrm>
             <a:off x="335520" y="1269000"/>
-            <a:ext cx="5598720" cy="5039280"/>
+            <a:ext cx="5598360" cy="5038920"/>
           </a:xfrm>
           <a:prstGeom prst="rect">
             <a:avLst/>
@@ -37198,7 +37138,7 @@
         <p:spPr>
           <a:xfrm>
             <a:off x="487800" y="1421280"/>
-            <a:ext cx="5598720" cy="5039280"/>
+            <a:ext cx="5598360" cy="5038920"/>
           </a:xfrm>
           <a:prstGeom prst="rect">
             <a:avLst/>
@@ -37295,7 +37235,7 @@
         <p:spPr>
           <a:xfrm>
             <a:off x="6620040" y="1869840"/>
-            <a:ext cx="4170960" cy="4170960"/>
+            <a:ext cx="4170600" cy="4170600"/>
           </a:xfrm>
           <a:prstGeom prst="rect">
             <a:avLst/>
@@ -37344,7 +37284,7 @@
         <p:spPr>
           <a:xfrm>
             <a:off x="335520" y="1268640"/>
-            <a:ext cx="10743480" cy="5031000"/>
+            <a:ext cx="10743120" cy="5030640"/>
           </a:xfrm>
           <a:prstGeom prst="rect">
             <a:avLst/>
@@ -37404,7 +37344,7 @@
         <p:spPr>
           <a:xfrm>
             <a:off x="335520" y="764640"/>
-            <a:ext cx="10743480" cy="494280"/>
+            <a:ext cx="10743120" cy="493920"/>
           </a:xfrm>
           <a:prstGeom prst="rect">
             <a:avLst/>
@@ -37483,7 +37423,7 @@
         <p:spPr>
           <a:xfrm>
             <a:off x="542880" y="722520"/>
-            <a:ext cx="10355040" cy="495720"/>
+            <a:ext cx="10354680" cy="495360"/>
           </a:xfrm>
           <a:prstGeom prst="rect">
             <a:avLst/>
@@ -37535,7 +37475,7 @@
         <p:spPr>
           <a:xfrm>
             <a:off x="609480" y="1769400"/>
-            <a:ext cx="10585440" cy="4853520"/>
+            <a:ext cx="10585080" cy="4853160"/>
           </a:xfrm>
           <a:prstGeom prst="rect">
             <a:avLst/>
@@ -37741,7 +37681,7 @@
         <p:spPr>
           <a:xfrm>
             <a:off x="542880" y="721800"/>
-            <a:ext cx="10355040" cy="495720"/>
+            <a:ext cx="10354680" cy="495360"/>
           </a:xfrm>
           <a:prstGeom prst="rect">
             <a:avLst/>
@@ -37795,7 +37735,7 @@
         <p:spPr>
           <a:xfrm>
             <a:off x="542880" y="1267200"/>
-            <a:ext cx="10355040" cy="495720"/>
+            <a:ext cx="10354680" cy="495360"/>
           </a:xfrm>
           <a:prstGeom prst="rect">
             <a:avLst/>
@@ -37853,7 +37793,7 @@
         <p:spPr>
           <a:xfrm>
             <a:off x="542880" y="2387520"/>
-            <a:ext cx="10100160" cy="2077560"/>
+            <a:ext cx="10099800" cy="2077200"/>
           </a:xfrm>
           <a:prstGeom prst="rect">
             <a:avLst/>
@@ -37872,7 +37812,7 @@
         <p:spPr>
           <a:xfrm>
             <a:off x="5519160" y="2297880"/>
-            <a:ext cx="1816200" cy="2256480"/>
+            <a:ext cx="1815840" cy="2256120"/>
           </a:xfrm>
           <a:prstGeom prst="frame">
             <a:avLst>
@@ -37962,7 +37902,7 @@
         <p:spPr>
           <a:xfrm>
             <a:off x="542880" y="757800"/>
-            <a:ext cx="10355040" cy="495720"/>
+            <a:ext cx="10354680" cy="495360"/>
           </a:xfrm>
           <a:prstGeom prst="rect">
             <a:avLst/>
@@ -38016,7 +37956,7 @@
         <p:spPr>
           <a:xfrm>
             <a:off x="542880" y="1303200"/>
-            <a:ext cx="10355040" cy="495720"/>
+            <a:ext cx="10354680" cy="495360"/>
           </a:xfrm>
           <a:prstGeom prst="rect">
             <a:avLst/>
@@ -38070,7 +38010,7 @@
         <p:spPr>
           <a:xfrm>
             <a:off x="451800" y="1709280"/>
-            <a:ext cx="8222400" cy="4350600"/>
+            <a:ext cx="8222040" cy="4350240"/>
           </a:xfrm>
           <a:prstGeom prst="rect">
             <a:avLst/>
@@ -38115,7 +38055,7 @@
         <p:spPr>
           <a:xfrm>
             <a:off x="604080" y="1861560"/>
-            <a:ext cx="8222400" cy="4350600"/>
+            <a:ext cx="8222040" cy="4350240"/>
           </a:xfrm>
           <a:prstGeom prst="rect">
             <a:avLst/>
@@ -38278,7 +38218,7 @@
         <p:spPr>
           <a:xfrm>
             <a:off x="335520" y="4406760"/>
-            <a:ext cx="10746720" cy="1355760"/>
+            <a:ext cx="10746360" cy="1355400"/>
           </a:xfrm>
           <a:prstGeom prst="rect">
             <a:avLst/>
@@ -38332,7 +38272,7 @@
         <p:spPr>
           <a:xfrm>
             <a:off x="335520" y="2906640"/>
-            <a:ext cx="10746720" cy="1493640"/>
+            <a:ext cx="10746360" cy="1493280"/>
           </a:xfrm>
           <a:prstGeom prst="rect">
             <a:avLst/>
@@ -38407,7 +38347,7 @@
         <p:spPr>
           <a:xfrm>
             <a:off x="542880" y="721800"/>
-            <a:ext cx="10355040" cy="495720"/>
+            <a:ext cx="10354680" cy="495360"/>
           </a:xfrm>
           <a:prstGeom prst="rect">
             <a:avLst/>
@@ -38461,7 +38401,7 @@
         <p:spPr>
           <a:xfrm>
             <a:off x="542880" y="1267200"/>
-            <a:ext cx="10355040" cy="495720"/>
+            <a:ext cx="10354680" cy="495360"/>
           </a:xfrm>
           <a:prstGeom prst="rect">
             <a:avLst/>
@@ -38515,7 +38455,7 @@
         <p:spPr>
           <a:xfrm>
             <a:off x="451800" y="1709280"/>
-            <a:ext cx="8222400" cy="4350600"/>
+            <a:ext cx="8222040" cy="4350240"/>
           </a:xfrm>
           <a:prstGeom prst="rect">
             <a:avLst/>
@@ -38564,7 +38504,7 @@
         <p:spPr>
           <a:xfrm>
             <a:off x="609480" y="1769400"/>
-            <a:ext cx="10585440" cy="4853520"/>
+            <a:ext cx="10585080" cy="4853160"/>
           </a:xfrm>
           <a:prstGeom prst="rect">
             <a:avLst/>
@@ -38875,7 +38815,7 @@
         <p:spPr>
           <a:xfrm>
             <a:off x="542880" y="721800"/>
-            <a:ext cx="10355040" cy="495720"/>
+            <a:ext cx="10354680" cy="495360"/>
           </a:xfrm>
           <a:prstGeom prst="rect">
             <a:avLst/>
@@ -38929,7 +38869,7 @@
         <p:spPr>
           <a:xfrm>
             <a:off x="542880" y="1267200"/>
-            <a:ext cx="10355040" cy="495720"/>
+            <a:ext cx="10354680" cy="495360"/>
           </a:xfrm>
           <a:prstGeom prst="rect">
             <a:avLst/>
@@ -38983,7 +38923,7 @@
         <p:spPr>
           <a:xfrm>
             <a:off x="451800" y="1709280"/>
-            <a:ext cx="8222400" cy="4350600"/>
+            <a:ext cx="8222040" cy="4350240"/>
           </a:xfrm>
           <a:prstGeom prst="rect">
             <a:avLst/>
@@ -39032,7 +38972,7 @@
         <p:spPr>
           <a:xfrm>
             <a:off x="609480" y="1769400"/>
-            <a:ext cx="10585440" cy="4853520"/>
+            <a:ext cx="10585080" cy="4853160"/>
           </a:xfrm>
           <a:prstGeom prst="rect">
             <a:avLst/>

</xml_diff>